<commit_message>
UI.pptx(画面3,4,6,7を追加)　UI_screen_instruction.txt(画面3の部分を追加) refs #27
</commit_message>
<xml_diff>
--- a/client/UI/UI.pptx
+++ b/client/UI/UI.pptx
@@ -5,16 +5,15 @@
     <p:sldMasterId id="2147483648" r:id="rId1"/>
   </p:sldMasterIdLst>
   <p:notesMasterIdLst>
-    <p:notesMasterId r:id="rId9"/>
+    <p:notesMasterId r:id="rId8"/>
   </p:notesMasterIdLst>
   <p:sldIdLst>
     <p:sldId id="259" r:id="rId2"/>
     <p:sldId id="258" r:id="rId3"/>
     <p:sldId id="261" r:id="rId4"/>
     <p:sldId id="263" r:id="rId5"/>
-    <p:sldId id="266" r:id="rId6"/>
-    <p:sldId id="264" r:id="rId7"/>
-    <p:sldId id="265" r:id="rId8"/>
+    <p:sldId id="264" r:id="rId6"/>
+    <p:sldId id="265" r:id="rId7"/>
   </p:sldIdLst>
   <p:sldSz cx="6858000" cy="9144000" type="screen4x3"/>
   <p:notesSz cx="6858000" cy="9144000"/>
@@ -199,7 +198,7 @@
             <a:fld id="{6CB782D2-A261-4730-B1CD-5DE0860CDF7E}" type="datetimeFigureOut">
               <a:rPr kumimoji="1" lang="ja-JP" altLang="en-US" smtClean="0"/>
               <a:pPr/>
-              <a:t>2013/3/13</a:t>
+              <a:t>2013/3/14</a:t>
             </a:fld>
             <a:endParaRPr kumimoji="1" lang="ja-JP" altLang="en-US"/>
           </a:p>
@@ -1057,11 +1056,15 @@
           <a:p>
             <a:r>
               <a:rPr lang="ja-JP" altLang="en-US" sz="1800" dirty="0" smtClean="0"/>
-              <a:t>⑤カメラ</a:t>
+              <a:t>⑥</a:t>
+            </a:r>
+            <a:r>
+              <a:rPr lang="en-US" altLang="ja-JP" sz="1800" dirty="0" smtClean="0"/>
+              <a:t>SNS</a:t>
             </a:r>
             <a:r>
               <a:rPr lang="ja-JP" altLang="en-US" sz="1800" dirty="0" smtClean="0"/>
-              <a:t>画面</a:t>
+              <a:t>アカウント選択画面</a:t>
             </a:r>
             <a:endParaRPr lang="en-US" altLang="ja-JP" sz="1800" dirty="0" smtClean="0"/>
           </a:p>
@@ -1150,15 +1153,15 @@
           <a:p>
             <a:r>
               <a:rPr lang="ja-JP" altLang="en-US" sz="1800" dirty="0" smtClean="0"/>
-              <a:t>⑥</a:t>
+              <a:t>画面⑦</a:t>
             </a:r>
             <a:r>
               <a:rPr lang="en-US" altLang="ja-JP" sz="1800" dirty="0" smtClean="0"/>
-              <a:t>SNS</a:t>
+              <a:t>Topic</a:t>
             </a:r>
             <a:r>
               <a:rPr lang="ja-JP" altLang="en-US" sz="1800" dirty="0" smtClean="0"/>
-              <a:t>アカウント選択画面</a:t>
+              <a:t>一覧画面</a:t>
             </a:r>
             <a:endParaRPr lang="en-US" altLang="ja-JP" sz="1800" dirty="0" smtClean="0"/>
           </a:p>
@@ -1186,107 +1189,6 @@
               <a:rPr kumimoji="1" lang="ja-JP" altLang="en-US" smtClean="0"/>
               <a:pPr/>
               <a:t>6</a:t>
-            </a:fld>
-            <a:endParaRPr kumimoji="1" lang="ja-JP" altLang="en-US"/>
-          </a:p>
-        </p:txBody>
-      </p:sp>
-    </p:spTree>
-  </p:cSld>
-  <p:clrMapOvr>
-    <a:masterClrMapping/>
-  </p:clrMapOvr>
-</p:notes>
-</file>
-
-<file path=ppt/notesSlides/notesSlide7.xml><?xml version="1.0" encoding="utf-8"?>
-<p:notes xmlns:a="http://schemas.openxmlformats.org/drawingml/2006/main" xmlns:r="http://schemas.openxmlformats.org/officeDocument/2006/relationships" xmlns:p="http://schemas.openxmlformats.org/presentationml/2006/main">
-  <p:cSld>
-    <p:spTree>
-      <p:nvGrpSpPr>
-        <p:cNvPr id="1" name=""/>
-        <p:cNvGrpSpPr/>
-        <p:nvPr/>
-      </p:nvGrpSpPr>
-      <p:grpSpPr>
-        <a:xfrm>
-          <a:off x="0" y="0"/>
-          <a:ext cx="0" cy="0"/>
-          <a:chOff x="0" y="0"/>
-          <a:chExt cx="0" cy="0"/>
-        </a:xfrm>
-      </p:grpSpPr>
-      <p:sp>
-        <p:nvSpPr>
-          <p:cNvPr id="2" name="スライド イメージ プレースホルダ 1"/>
-          <p:cNvSpPr>
-            <a:spLocks noGrp="1" noRot="1" noChangeAspect="1"/>
-          </p:cNvSpPr>
-          <p:nvPr>
-            <p:ph type="sldImg"/>
-          </p:nvPr>
-        </p:nvSpPr>
-        <p:spPr/>
-      </p:sp>
-      <p:sp>
-        <p:nvSpPr>
-          <p:cNvPr id="3" name="ノート プレースホルダ 2"/>
-          <p:cNvSpPr>
-            <a:spLocks noGrp="1"/>
-          </p:cNvSpPr>
-          <p:nvPr>
-            <p:ph type="body" idx="1"/>
-          </p:nvPr>
-        </p:nvSpPr>
-        <p:spPr/>
-        <p:txBody>
-          <a:bodyPr>
-            <a:normAutofit lnSpcReduction="10000"/>
-          </a:bodyPr>
-          <a:lstStyle/>
-          <a:p>
-            <a:r>
-              <a:rPr lang="ja-JP" altLang="en-US" sz="1800" dirty="0" smtClean="0"/>
-              <a:t>画面</a:t>
-            </a:r>
-            <a:r>
-              <a:rPr lang="ja-JP" altLang="en-US" sz="1800" dirty="0" smtClean="0"/>
-              <a:t>⑦</a:t>
-            </a:r>
-            <a:r>
-              <a:rPr lang="en-US" altLang="ja-JP" sz="1800" dirty="0" smtClean="0"/>
-              <a:t>Topic</a:t>
-            </a:r>
-            <a:r>
-              <a:rPr lang="ja-JP" altLang="en-US" sz="1800" dirty="0" smtClean="0"/>
-              <a:t>一覧画面</a:t>
-            </a:r>
-            <a:endParaRPr lang="en-US" altLang="ja-JP" sz="1800" dirty="0" smtClean="0"/>
-          </a:p>
-          <a:p>
-            <a:endParaRPr lang="en-US" altLang="ja-JP" sz="1800" dirty="0" smtClean="0"/>
-          </a:p>
-        </p:txBody>
-      </p:sp>
-      <p:sp>
-        <p:nvSpPr>
-          <p:cNvPr id="4" name="スライド番号プレースホルダ 3"/>
-          <p:cNvSpPr>
-            <a:spLocks noGrp="1"/>
-          </p:cNvSpPr>
-          <p:nvPr>
-            <p:ph type="sldNum" sz="quarter" idx="10"/>
-          </p:nvPr>
-        </p:nvSpPr>
-        <p:spPr/>
-        <p:txBody>
-          <a:bodyPr/>
-          <a:lstStyle/>
-          <a:p>
-            <a:fld id="{BA871DDF-D14D-477B-B801-AFB41A39A4DB}" type="slidenum">
-              <a:rPr kumimoji="1" lang="ja-JP" altLang="en-US" smtClean="0"/>
-              <a:pPr/>
-              <a:t>7</a:t>
             </a:fld>
             <a:endParaRPr kumimoji="1" lang="ja-JP" altLang="en-US"/>
           </a:p>
@@ -1482,7 +1384,7 @@
             <a:fld id="{8CC0D75B-0053-42EA-80F5-0CA201F86BEB}" type="datetimeFigureOut">
               <a:rPr kumimoji="1" lang="ja-JP" altLang="en-US" smtClean="0"/>
               <a:pPr/>
-              <a:t>2013/3/13</a:t>
+              <a:t>2013/3/14</a:t>
             </a:fld>
             <a:endParaRPr kumimoji="1" lang="ja-JP" altLang="en-US"/>
           </a:p>
@@ -1681,7 +1583,7 @@
             <a:fld id="{8CC0D75B-0053-42EA-80F5-0CA201F86BEB}" type="datetimeFigureOut">
               <a:rPr kumimoji="1" lang="ja-JP" altLang="en-US" smtClean="0"/>
               <a:pPr/>
-              <a:t>2013/3/13</a:t>
+              <a:t>2013/3/14</a:t>
             </a:fld>
             <a:endParaRPr kumimoji="1" lang="ja-JP" altLang="en-US"/>
           </a:p>
@@ -1890,7 +1792,7 @@
             <a:fld id="{8CC0D75B-0053-42EA-80F5-0CA201F86BEB}" type="datetimeFigureOut">
               <a:rPr kumimoji="1" lang="ja-JP" altLang="en-US" smtClean="0"/>
               <a:pPr/>
-              <a:t>2013/3/13</a:t>
+              <a:t>2013/3/14</a:t>
             </a:fld>
             <a:endParaRPr kumimoji="1" lang="ja-JP" altLang="en-US"/>
           </a:p>
@@ -2089,7 +1991,7 @@
             <a:fld id="{8CC0D75B-0053-42EA-80F5-0CA201F86BEB}" type="datetimeFigureOut">
               <a:rPr kumimoji="1" lang="ja-JP" altLang="en-US" smtClean="0"/>
               <a:pPr/>
-              <a:t>2013/3/13</a:t>
+              <a:t>2013/3/14</a:t>
             </a:fld>
             <a:endParaRPr kumimoji="1" lang="ja-JP" altLang="en-US"/>
           </a:p>
@@ -2332,7 +2234,7 @@
             <a:fld id="{8CC0D75B-0053-42EA-80F5-0CA201F86BEB}" type="datetimeFigureOut">
               <a:rPr kumimoji="1" lang="ja-JP" altLang="en-US" smtClean="0"/>
               <a:pPr/>
-              <a:t>2013/3/13</a:t>
+              <a:t>2013/3/14</a:t>
             </a:fld>
             <a:endParaRPr kumimoji="1" lang="ja-JP" altLang="en-US"/>
           </a:p>
@@ -2681,7 +2583,7 @@
             <a:fld id="{8CC0D75B-0053-42EA-80F5-0CA201F86BEB}" type="datetimeFigureOut">
               <a:rPr kumimoji="1" lang="ja-JP" altLang="en-US" smtClean="0"/>
               <a:pPr/>
-              <a:t>2013/3/13</a:t>
+              <a:t>2013/3/14</a:t>
             </a:fld>
             <a:endParaRPr kumimoji="1" lang="ja-JP" altLang="en-US"/>
           </a:p>
@@ -3164,7 +3066,7 @@
             <a:fld id="{8CC0D75B-0053-42EA-80F5-0CA201F86BEB}" type="datetimeFigureOut">
               <a:rPr kumimoji="1" lang="ja-JP" altLang="en-US" smtClean="0"/>
               <a:pPr/>
-              <a:t>2013/3/13</a:t>
+              <a:t>2013/3/14</a:t>
             </a:fld>
             <a:endParaRPr kumimoji="1" lang="ja-JP" altLang="en-US"/>
           </a:p>
@@ -3279,7 +3181,7 @@
             <a:fld id="{8CC0D75B-0053-42EA-80F5-0CA201F86BEB}" type="datetimeFigureOut">
               <a:rPr kumimoji="1" lang="ja-JP" altLang="en-US" smtClean="0"/>
               <a:pPr/>
-              <a:t>2013/3/13</a:t>
+              <a:t>2013/3/14</a:t>
             </a:fld>
             <a:endParaRPr kumimoji="1" lang="ja-JP" altLang="en-US"/>
           </a:p>
@@ -3380,7 +3282,7 @@
             <a:fld id="{8CC0D75B-0053-42EA-80F5-0CA201F86BEB}" type="datetimeFigureOut">
               <a:rPr kumimoji="1" lang="ja-JP" altLang="en-US" smtClean="0"/>
               <a:pPr/>
-              <a:t>2013/3/13</a:t>
+              <a:t>2013/3/14</a:t>
             </a:fld>
             <a:endParaRPr kumimoji="1" lang="ja-JP" altLang="en-US"/>
           </a:p>
@@ -3704,7 +3606,7 @@
             <a:fld id="{8CC0D75B-0053-42EA-80F5-0CA201F86BEB}" type="datetimeFigureOut">
               <a:rPr kumimoji="1" lang="ja-JP" altLang="en-US" smtClean="0"/>
               <a:pPr/>
-              <a:t>2013/3/13</a:t>
+              <a:t>2013/3/14</a:t>
             </a:fld>
             <a:endParaRPr kumimoji="1" lang="ja-JP" altLang="en-US"/>
           </a:p>
@@ -3954,7 +3856,7 @@
             <a:fld id="{8CC0D75B-0053-42EA-80F5-0CA201F86BEB}" type="datetimeFigureOut">
               <a:rPr kumimoji="1" lang="ja-JP" altLang="en-US" smtClean="0"/>
               <a:pPr/>
-              <a:t>2013/3/13</a:t>
+              <a:t>2013/3/14</a:t>
             </a:fld>
             <a:endParaRPr kumimoji="1" lang="ja-JP" altLang="en-US"/>
           </a:p>
@@ -4205,7 +4107,7 @@
             <a:fld id="{8CC0D75B-0053-42EA-80F5-0CA201F86BEB}" type="datetimeFigureOut">
               <a:rPr kumimoji="1" lang="ja-JP" altLang="en-US" smtClean="0"/>
               <a:pPr/>
-              <a:t>2013/3/13</a:t>
+              <a:t>2013/3/14</a:t>
             </a:fld>
             <a:endParaRPr kumimoji="1" lang="ja-JP" altLang="en-US"/>
           </a:p>
@@ -5025,7 +4927,7 @@
         </p:nvSpPr>
         <p:spPr>
           <a:xfrm>
-            <a:off x="692696" y="4499992"/>
+            <a:off x="692696" y="4860032"/>
             <a:ext cx="1656184" cy="576064"/>
           </a:xfrm>
           <a:prstGeom prst="roundRect">
@@ -5054,10 +4956,6 @@
             <a:r>
               <a:rPr kumimoji="1" lang="ja-JP" altLang="en-US" sz="2400" dirty="0" smtClean="0"/>
               <a:t>～</a:t>
-            </a:r>
-            <a:r>
-              <a:rPr kumimoji="1" lang="en-US" altLang="ja-JP" sz="2400" dirty="0" smtClean="0"/>
-              <a:t>×</a:t>
             </a:r>
             <a:endParaRPr kumimoji="1" lang="ja-JP" altLang="en-US" sz="2400" dirty="0"/>
           </a:p>
@@ -5333,7 +5231,7 @@
         </p:nvSpPr>
         <p:spPr>
           <a:xfrm>
-            <a:off x="2492896" y="4499992"/>
+            <a:off x="2492896" y="4860032"/>
             <a:ext cx="1656184" cy="576064"/>
           </a:xfrm>
           <a:prstGeom prst="roundRect">
@@ -5363,10 +5261,6 @@
               <a:rPr kumimoji="1" lang="ja-JP" altLang="en-US" sz="2400" dirty="0" smtClean="0"/>
               <a:t>～</a:t>
             </a:r>
-            <a:r>
-              <a:rPr kumimoji="1" lang="en-US" altLang="ja-JP" sz="2400" dirty="0" smtClean="0"/>
-              <a:t>×</a:t>
-            </a:r>
             <a:endParaRPr kumimoji="1" lang="ja-JP" altLang="en-US" sz="2400" dirty="0"/>
           </a:p>
         </p:txBody>
@@ -5379,7 +5273,7 @@
         </p:nvSpPr>
         <p:spPr>
           <a:xfrm>
-            <a:off x="4365104" y="4499992"/>
+            <a:off x="4365104" y="4860032"/>
             <a:ext cx="1656184" cy="576064"/>
           </a:xfrm>
           <a:prstGeom prst="roundRect">
@@ -5407,17 +5301,6 @@
             <a:r>
               <a:rPr kumimoji="1" lang="ja-JP" altLang="en-US" sz="2400" dirty="0" smtClean="0"/>
               <a:t>～</a:t>
-            </a:r>
-            <a:r>
-              <a:rPr lang="ja-JP" altLang="en-US" sz="2400" dirty="0" smtClean="0">
-                <a:solidFill>
-                  <a:schemeClr val="accent2">
-                    <a:lumMod val="60000"/>
-                    <a:lumOff val="40000"/>
-                  </a:schemeClr>
-                </a:solidFill>
-              </a:rPr>
-              <a:t>＋</a:t>
             </a:r>
             <a:endParaRPr kumimoji="1" lang="ja-JP" altLang="en-US" sz="2400" dirty="0">
               <a:solidFill>
@@ -5643,6 +5526,88 @@
               </a:rPr>
               <a:t>)</a:t>
             </a:r>
+          </a:p>
+        </p:txBody>
+      </p:sp>
+      <p:sp>
+        <p:nvSpPr>
+          <p:cNvPr id="27" name="テキスト ボックス 26"/>
+          <p:cNvSpPr txBox="1"/>
+          <p:nvPr/>
+        </p:nvSpPr>
+        <p:spPr>
+          <a:xfrm>
+            <a:off x="27384" y="3995936"/>
+            <a:ext cx="6858000" cy="830997"/>
+          </a:xfrm>
+          <a:prstGeom prst="rect">
+            <a:avLst/>
+          </a:prstGeom>
+          <a:noFill/>
+        </p:spPr>
+        <p:txBody>
+          <a:bodyPr wrap="square" rtlCol="0">
+            <a:spAutoFit/>
+          </a:bodyPr>
+          <a:lstStyle/>
+          <a:p>
+            <a:pPr algn="ctr"/>
+            <a:r>
+              <a:rPr kumimoji="1" lang="ja-JP" altLang="en-US" sz="2400" b="1" dirty="0" smtClean="0"/>
+              <a:t>キーフレーズ一覧</a:t>
+            </a:r>
+            <a:r>
+              <a:rPr kumimoji="1" lang="en-US" altLang="ja-JP" sz="2400" b="1" dirty="0" smtClean="0"/>
+              <a:t/>
+            </a:r>
+            <a:br>
+              <a:rPr kumimoji="1" lang="en-US" altLang="ja-JP" sz="2400" b="1" dirty="0" smtClean="0"/>
+            </a:br>
+            <a:r>
+              <a:rPr kumimoji="1" lang="ja-JP" altLang="en-US" sz="2400" b="1" dirty="0" smtClean="0">
+                <a:solidFill>
+                  <a:srgbClr val="93CDDD"/>
+                </a:solidFill>
+              </a:rPr>
+              <a:t>■</a:t>
+            </a:r>
+            <a:r>
+              <a:rPr kumimoji="1" lang="ja-JP" altLang="en-US" sz="2400" b="1" dirty="0" smtClean="0"/>
+              <a:t>登録　</a:t>
+            </a:r>
+            <a:r>
+              <a:rPr kumimoji="1" lang="ja-JP" altLang="en-US" sz="2400" b="1" dirty="0" smtClean="0">
+                <a:solidFill>
+                  <a:schemeClr val="accent5">
+                    <a:lumMod val="75000"/>
+                  </a:schemeClr>
+                </a:solidFill>
+              </a:rPr>
+              <a:t>■</a:t>
+            </a:r>
+            <a:r>
+              <a:rPr lang="ja-JP" altLang="en-US" sz="2400" b="1" dirty="0" smtClean="0"/>
+              <a:t>削除</a:t>
+            </a:r>
+            <a:r>
+              <a:rPr kumimoji="1" lang="en-US" altLang="ja-JP" sz="2400" b="1" dirty="0" smtClean="0"/>
+              <a:t>(</a:t>
+            </a:r>
+            <a:r>
+              <a:rPr kumimoji="1" lang="ja-JP" altLang="en-US" sz="2400" b="1" dirty="0" smtClean="0"/>
+              <a:t>タップすると切り替わります</a:t>
+            </a:r>
+            <a:r>
+              <a:rPr kumimoji="1" lang="en-US" altLang="ja-JP" sz="2400" b="1" dirty="0" smtClean="0"/>
+              <a:t>)</a:t>
+            </a:r>
+            <a:endParaRPr kumimoji="1" lang="ja-JP" altLang="en-US" sz="2400" b="1" dirty="0">
+              <a:solidFill>
+                <a:schemeClr val="accent5">
+                  <a:lumMod val="75000"/>
+                </a:schemeClr>
+              </a:solidFill>
+            </a:endParaRPr>
           </a:p>
         </p:txBody>
       </p:sp>
@@ -6602,6 +6567,10 @@
           <a:prstGeom prst="rect">
             <a:avLst/>
           </a:prstGeom>
+          <a:noFill/>
+          <a:ln>
+            <a:noFill/>
+          </a:ln>
         </p:spPr>
       </p:pic>
       <p:pic>
@@ -6716,8 +6685,8 @@
         </p:nvSpPr>
         <p:spPr>
           <a:xfrm>
-            <a:off x="404664" y="1907704"/>
-            <a:ext cx="4248472" cy="954107"/>
+            <a:off x="548680" y="1816532"/>
+            <a:ext cx="6048672" cy="523220"/>
           </a:xfrm>
           <a:prstGeom prst="rect">
             <a:avLst/>
@@ -6746,14 +6715,7 @@
             </a:r>
             <a:r>
               <a:rPr kumimoji="1" lang="ja-JP" altLang="en-US" sz="2800" dirty="0" smtClean="0"/>
-              <a:t>度キャンセルした</a:t>
-            </a:r>
-            <a:endParaRPr kumimoji="1" lang="en-US" altLang="ja-JP" sz="2800" dirty="0" smtClean="0"/>
-          </a:p>
-          <a:p>
-            <a:r>
-              <a:rPr kumimoji="1" lang="ja-JP" altLang="en-US" sz="2800" dirty="0" smtClean="0"/>
-              <a:t>キーワードを</a:t>
+              <a:t>度キャンセルしたキーワードを</a:t>
             </a:r>
             <a:r>
               <a:rPr lang="ja-JP" altLang="en-US" sz="2800" dirty="0" smtClean="0"/>
@@ -6771,7 +6733,7 @@
         </p:nvSpPr>
         <p:spPr>
           <a:xfrm>
-            <a:off x="404664" y="3347864"/>
+            <a:off x="1772816" y="3563888"/>
             <a:ext cx="3888432" cy="523220"/>
           </a:xfrm>
           <a:prstGeom prst="rect">
@@ -6815,7 +6777,7 @@
         </p:nvSpPr>
         <p:spPr>
           <a:xfrm>
-            <a:off x="620688" y="4067944"/>
+            <a:off x="1988840" y="4283968"/>
             <a:ext cx="1296144" cy="1152128"/>
           </a:xfrm>
           <a:prstGeom prst="roundRect">
@@ -6868,7 +6830,7 @@
         </p:nvSpPr>
         <p:spPr>
           <a:xfrm>
-            <a:off x="2132856" y="4067944"/>
+            <a:off x="3501008" y="4283968"/>
             <a:ext cx="1296144" cy="1152128"/>
           </a:xfrm>
           <a:prstGeom prst="roundRect">
@@ -7077,7 +7039,7 @@
         </p:nvSpPr>
         <p:spPr>
           <a:xfrm>
-            <a:off x="2852936" y="4707305"/>
+            <a:off x="4221088" y="4923329"/>
             <a:ext cx="504056" cy="584775"/>
           </a:xfrm>
           <a:prstGeom prst="rect">
@@ -7186,6 +7148,482 @@
           </a:prstGeom>
         </p:spPr>
       </p:pic>
+      <p:grpSp>
+        <p:nvGrpSpPr>
+          <p:cNvPr id="26" name="グループ化 25"/>
+          <p:cNvGrpSpPr/>
+          <p:nvPr/>
+        </p:nvGrpSpPr>
+        <p:grpSpPr>
+          <a:xfrm>
+            <a:off x="2348880" y="2411760"/>
+            <a:ext cx="2376264" cy="648072"/>
+            <a:chOff x="2348880" y="2411760"/>
+            <a:chExt cx="2376264" cy="648072"/>
+          </a:xfrm>
+        </p:grpSpPr>
+        <p:sp>
+          <p:nvSpPr>
+            <p:cNvPr id="18" name="角丸四角形 17"/>
+            <p:cNvSpPr/>
+            <p:nvPr/>
+          </p:nvSpPr>
+          <p:spPr>
+            <a:xfrm>
+              <a:off x="2348880" y="2411760"/>
+              <a:ext cx="2376264" cy="648072"/>
+            </a:xfrm>
+            <a:prstGeom prst="roundRect">
+              <a:avLst/>
+            </a:prstGeom>
+            <a:blipFill>
+              <a:blip r:embed="rId8" cstate="print"/>
+              <a:stretch>
+                <a:fillRect/>
+              </a:stretch>
+            </a:blipFill>
+            <a:ln>
+              <a:noFill/>
+            </a:ln>
+          </p:spPr>
+          <p:style>
+            <a:lnRef idx="2">
+              <a:schemeClr val="accent1">
+                <a:shade val="50000"/>
+              </a:schemeClr>
+            </a:lnRef>
+            <a:fillRef idx="1">
+              <a:schemeClr val="accent1"/>
+            </a:fillRef>
+            <a:effectRef idx="0">
+              <a:schemeClr val="accent1"/>
+            </a:effectRef>
+            <a:fontRef idx="minor">
+              <a:schemeClr val="lt1"/>
+            </a:fontRef>
+          </p:style>
+          <p:txBody>
+            <a:bodyPr rtlCol="0" anchor="ctr"/>
+            <a:lstStyle/>
+            <a:p>
+              <a:pPr algn="ctr"/>
+              <a:r>
+                <a:rPr kumimoji="1" lang="ja-JP" altLang="en-US" dirty="0" smtClean="0"/>
+                <a:t>　　　　　　　　　</a:t>
+              </a:r>
+              <a:r>
+                <a:rPr kumimoji="1" lang="en-US" altLang="ja-JP" dirty="0" smtClean="0"/>
+                <a:t>OFF</a:t>
+              </a:r>
+              <a:endParaRPr kumimoji="1" lang="ja-JP" altLang="en-US" dirty="0" smtClean="0"/>
+            </a:p>
+          </p:txBody>
+        </p:sp>
+        <p:sp>
+          <p:nvSpPr>
+            <p:cNvPr id="19" name="角丸四角形 18"/>
+            <p:cNvSpPr/>
+            <p:nvPr/>
+          </p:nvSpPr>
+          <p:spPr>
+            <a:xfrm>
+              <a:off x="2348880" y="2411760"/>
+              <a:ext cx="1296144" cy="648072"/>
+            </a:xfrm>
+            <a:prstGeom prst="roundRect">
+              <a:avLst/>
+            </a:prstGeom>
+            <a:blipFill>
+              <a:blip r:embed="rId9" cstate="print"/>
+              <a:stretch>
+                <a:fillRect/>
+              </a:stretch>
+            </a:blipFill>
+            <a:ln>
+              <a:noFill/>
+            </a:ln>
+          </p:spPr>
+          <p:style>
+            <a:lnRef idx="2">
+              <a:schemeClr val="accent1">
+                <a:shade val="50000"/>
+              </a:schemeClr>
+            </a:lnRef>
+            <a:fillRef idx="1">
+              <a:schemeClr val="accent1"/>
+            </a:fillRef>
+            <a:effectRef idx="0">
+              <a:schemeClr val="accent1"/>
+            </a:effectRef>
+            <a:fontRef idx="minor">
+              <a:schemeClr val="lt1"/>
+            </a:fontRef>
+          </p:style>
+          <p:txBody>
+            <a:bodyPr rtlCol="0" anchor="ctr"/>
+            <a:lstStyle/>
+            <a:p>
+              <a:pPr algn="ctr"/>
+              <a:r>
+                <a:rPr kumimoji="1" lang="en-US" altLang="ja-JP" dirty="0" smtClean="0"/>
+                <a:t>ON</a:t>
+              </a:r>
+              <a:endParaRPr kumimoji="1" lang="ja-JP" altLang="en-US" dirty="0" smtClean="0"/>
+            </a:p>
+          </p:txBody>
+        </p:sp>
+      </p:grpSp>
+      <p:sp>
+        <p:nvSpPr>
+          <p:cNvPr id="20" name="円形吹き出し 19"/>
+          <p:cNvSpPr/>
+          <p:nvPr/>
+        </p:nvSpPr>
+        <p:spPr>
+          <a:xfrm>
+            <a:off x="7461448" y="0"/>
+            <a:ext cx="4608512" cy="1872208"/>
+          </a:xfrm>
+          <a:prstGeom prst="wedgeEllipseCallout">
+            <a:avLst>
+              <a:gd name="adj1" fmla="val -69549"/>
+              <a:gd name="adj2" fmla="val 69517"/>
+            </a:avLst>
+          </a:prstGeom>
+          <a:solidFill>
+            <a:schemeClr val="tx2">
+              <a:lumMod val="20000"/>
+              <a:lumOff val="80000"/>
+            </a:schemeClr>
+          </a:solidFill>
+          <a:ln>
+            <a:noFill/>
+          </a:ln>
+        </p:spPr>
+        <p:style>
+          <a:lnRef idx="2">
+            <a:schemeClr val="accent1">
+              <a:shade val="50000"/>
+            </a:schemeClr>
+          </a:lnRef>
+          <a:fillRef idx="1">
+            <a:schemeClr val="accent1"/>
+          </a:fillRef>
+          <a:effectRef idx="0">
+            <a:schemeClr val="accent1"/>
+          </a:effectRef>
+          <a:fontRef idx="minor">
+            <a:schemeClr val="lt1"/>
+          </a:fontRef>
+        </p:style>
+        <p:txBody>
+          <a:bodyPr rtlCol="0" anchor="ctr"/>
+          <a:lstStyle/>
+          <a:p>
+            <a:pPr algn="ctr"/>
+            <a:r>
+              <a:rPr lang="en-US" altLang="ja-JP" dirty="0" smtClean="0">
+                <a:solidFill>
+                  <a:schemeClr val="tx1"/>
+                </a:solidFill>
+              </a:rPr>
+              <a:t>ON</a:t>
+            </a:r>
+            <a:r>
+              <a:rPr lang="ja-JP" altLang="en-US" dirty="0" smtClean="0">
+                <a:solidFill>
+                  <a:schemeClr val="tx1"/>
+                </a:solidFill>
+              </a:rPr>
+              <a:t>と</a:t>
+            </a:r>
+            <a:r>
+              <a:rPr lang="en-US" altLang="ja-JP" dirty="0" smtClean="0">
+                <a:solidFill>
+                  <a:schemeClr val="tx1"/>
+                </a:solidFill>
+              </a:rPr>
+              <a:t>OFF</a:t>
+            </a:r>
+            <a:r>
+              <a:rPr lang="ja-JP" altLang="en-US" dirty="0" smtClean="0">
+                <a:solidFill>
+                  <a:schemeClr val="tx1"/>
+                </a:solidFill>
+              </a:rPr>
+              <a:t>の画像があって</a:t>
+            </a:r>
+            <a:endParaRPr lang="en-US" altLang="ja-JP" dirty="0" smtClean="0">
+              <a:solidFill>
+                <a:schemeClr val="tx1"/>
+              </a:solidFill>
+            </a:endParaRPr>
+          </a:p>
+          <a:p>
+            <a:pPr algn="ctr"/>
+            <a:r>
+              <a:rPr lang="ja-JP" altLang="en-US" dirty="0" smtClean="0">
+                <a:solidFill>
+                  <a:schemeClr val="tx1"/>
+                </a:solidFill>
+              </a:rPr>
+              <a:t>タップすると</a:t>
+            </a:r>
+            <a:r>
+              <a:rPr lang="ja-JP" altLang="en-US" dirty="0" smtClean="0">
+                <a:solidFill>
+                  <a:schemeClr val="tx1"/>
+                </a:solidFill>
+              </a:rPr>
+              <a:t>切り替わる</a:t>
+            </a:r>
+            <a:endParaRPr lang="en-US" altLang="ja-JP" dirty="0" smtClean="0">
+              <a:solidFill>
+                <a:schemeClr val="tx1"/>
+              </a:solidFill>
+            </a:endParaRPr>
+          </a:p>
+        </p:txBody>
+      </p:sp>
+      <p:sp>
+        <p:nvSpPr>
+          <p:cNvPr id="21" name="正方形/長方形 20"/>
+          <p:cNvSpPr/>
+          <p:nvPr/>
+        </p:nvSpPr>
+        <p:spPr>
+          <a:xfrm>
+            <a:off x="404664" y="1619672"/>
+            <a:ext cx="6192688" cy="1656184"/>
+          </a:xfrm>
+          <a:prstGeom prst="rect">
+            <a:avLst/>
+          </a:prstGeom>
+          <a:noFill/>
+          <a:ln>
+            <a:solidFill>
+              <a:schemeClr val="bg1"/>
+            </a:solidFill>
+          </a:ln>
+        </p:spPr>
+        <p:style>
+          <a:lnRef idx="2">
+            <a:schemeClr val="accent1">
+              <a:shade val="50000"/>
+            </a:schemeClr>
+          </a:lnRef>
+          <a:fillRef idx="1">
+            <a:schemeClr val="accent1"/>
+          </a:fillRef>
+          <a:effectRef idx="0">
+            <a:schemeClr val="accent1"/>
+          </a:effectRef>
+          <a:fontRef idx="minor">
+            <a:schemeClr val="lt1"/>
+          </a:fontRef>
+        </p:style>
+        <p:txBody>
+          <a:bodyPr rtlCol="0" anchor="ctr"/>
+          <a:lstStyle/>
+          <a:p>
+            <a:pPr algn="ctr"/>
+            <a:endParaRPr kumimoji="1" lang="ja-JP" altLang="en-US" dirty="0" smtClean="0"/>
+          </a:p>
+        </p:txBody>
+      </p:sp>
+      <p:sp>
+        <p:nvSpPr>
+          <p:cNvPr id="22" name="円形吹き出し 21"/>
+          <p:cNvSpPr/>
+          <p:nvPr/>
+        </p:nvSpPr>
+        <p:spPr>
+          <a:xfrm>
+            <a:off x="7613848" y="2411760"/>
+            <a:ext cx="2367880" cy="1872208"/>
+          </a:xfrm>
+          <a:prstGeom prst="wedgeEllipseCallout">
+            <a:avLst>
+              <a:gd name="adj1" fmla="val -88538"/>
+              <a:gd name="adj2" fmla="val -9380"/>
+            </a:avLst>
+          </a:prstGeom>
+          <a:solidFill>
+            <a:schemeClr val="tx2">
+              <a:lumMod val="20000"/>
+              <a:lumOff val="80000"/>
+            </a:schemeClr>
+          </a:solidFill>
+          <a:ln>
+            <a:noFill/>
+          </a:ln>
+        </p:spPr>
+        <p:style>
+          <a:lnRef idx="2">
+            <a:schemeClr val="accent1">
+              <a:shade val="50000"/>
+            </a:schemeClr>
+          </a:lnRef>
+          <a:fillRef idx="1">
+            <a:schemeClr val="accent1"/>
+          </a:fillRef>
+          <a:effectRef idx="0">
+            <a:schemeClr val="accent1"/>
+          </a:effectRef>
+          <a:fontRef idx="minor">
+            <a:schemeClr val="lt1"/>
+          </a:fontRef>
+        </p:style>
+        <p:txBody>
+          <a:bodyPr rtlCol="0" anchor="ctr"/>
+          <a:lstStyle/>
+          <a:p>
+            <a:pPr algn="ctr"/>
+            <a:r>
+              <a:rPr lang="ja-JP" altLang="en-US" dirty="0" smtClean="0">
+                <a:solidFill>
+                  <a:schemeClr val="tx1"/>
+                </a:solidFill>
+              </a:rPr>
+              <a:t>枠</a:t>
+            </a:r>
+            <a:r>
+              <a:rPr lang="en-US" altLang="ja-JP" dirty="0" smtClean="0">
+                <a:solidFill>
+                  <a:schemeClr val="tx1"/>
+                </a:solidFill>
+              </a:rPr>
+              <a:t>(</a:t>
+            </a:r>
+            <a:r>
+              <a:rPr lang="ja-JP" altLang="en-US" dirty="0" smtClean="0">
+                <a:solidFill>
+                  <a:schemeClr val="tx1"/>
+                </a:solidFill>
+              </a:rPr>
+              <a:t>画像</a:t>
+            </a:r>
+            <a:r>
+              <a:rPr lang="en-US" altLang="ja-JP" dirty="0" smtClean="0">
+                <a:solidFill>
+                  <a:schemeClr val="tx1"/>
+                </a:solidFill>
+              </a:rPr>
+              <a:t>)</a:t>
+            </a:r>
+          </a:p>
+        </p:txBody>
+      </p:sp>
+      <p:sp>
+        <p:nvSpPr>
+          <p:cNvPr id="24" name="正方形/長方形 23"/>
+          <p:cNvSpPr/>
+          <p:nvPr/>
+        </p:nvSpPr>
+        <p:spPr>
+          <a:xfrm>
+            <a:off x="404664" y="3491880"/>
+            <a:ext cx="6192688" cy="2160240"/>
+          </a:xfrm>
+          <a:prstGeom prst="rect">
+            <a:avLst/>
+          </a:prstGeom>
+          <a:noFill/>
+          <a:ln>
+            <a:solidFill>
+              <a:schemeClr val="bg1"/>
+            </a:solidFill>
+          </a:ln>
+        </p:spPr>
+        <p:style>
+          <a:lnRef idx="2">
+            <a:schemeClr val="accent1">
+              <a:shade val="50000"/>
+            </a:schemeClr>
+          </a:lnRef>
+          <a:fillRef idx="1">
+            <a:schemeClr val="accent1"/>
+          </a:fillRef>
+          <a:effectRef idx="0">
+            <a:schemeClr val="accent1"/>
+          </a:effectRef>
+          <a:fontRef idx="minor">
+            <a:schemeClr val="lt1"/>
+          </a:fontRef>
+        </p:style>
+        <p:txBody>
+          <a:bodyPr rtlCol="0" anchor="ctr"/>
+          <a:lstStyle/>
+          <a:p>
+            <a:pPr algn="ctr"/>
+            <a:endParaRPr kumimoji="1" lang="ja-JP" altLang="en-US" dirty="0" smtClean="0"/>
+          </a:p>
+        </p:txBody>
+      </p:sp>
+      <p:sp>
+        <p:nvSpPr>
+          <p:cNvPr id="27" name="円形吹き出し 26"/>
+          <p:cNvSpPr/>
+          <p:nvPr/>
+        </p:nvSpPr>
+        <p:spPr>
+          <a:xfrm>
+            <a:off x="5805264" y="4572000"/>
+            <a:ext cx="2367880" cy="1872208"/>
+          </a:xfrm>
+          <a:prstGeom prst="wedgeEllipseCallout">
+            <a:avLst>
+              <a:gd name="adj1" fmla="val -88538"/>
+              <a:gd name="adj2" fmla="val -9380"/>
+            </a:avLst>
+          </a:prstGeom>
+          <a:solidFill>
+            <a:schemeClr val="tx2">
+              <a:lumMod val="20000"/>
+              <a:lumOff val="80000"/>
+            </a:schemeClr>
+          </a:solidFill>
+          <a:ln>
+            <a:noFill/>
+          </a:ln>
+        </p:spPr>
+        <p:style>
+          <a:lnRef idx="2">
+            <a:schemeClr val="accent1">
+              <a:shade val="50000"/>
+            </a:schemeClr>
+          </a:lnRef>
+          <a:fillRef idx="1">
+            <a:schemeClr val="accent1"/>
+          </a:fillRef>
+          <a:effectRef idx="0">
+            <a:schemeClr val="accent1"/>
+          </a:effectRef>
+          <a:fontRef idx="minor">
+            <a:schemeClr val="lt1"/>
+          </a:fontRef>
+        </p:style>
+        <p:txBody>
+          <a:bodyPr rtlCol="0" anchor="ctr"/>
+          <a:lstStyle/>
+          <a:p>
+            <a:pPr algn="ctr"/>
+            <a:r>
+              <a:rPr lang="ja-JP" altLang="en-US" dirty="0" smtClean="0">
+                <a:solidFill>
+                  <a:schemeClr val="tx1"/>
+                </a:solidFill>
+              </a:rPr>
+              <a:t>登録していない場合暗い</a:t>
+            </a:r>
+            <a:endParaRPr lang="en-US" altLang="ja-JP" dirty="0" smtClean="0">
+              <a:solidFill>
+                <a:schemeClr val="tx1"/>
+              </a:solidFill>
+            </a:endParaRPr>
+          </a:p>
+        </p:txBody>
+      </p:sp>
     </p:spTree>
   </p:cSld>
   <p:clrMapOvr>
@@ -7417,8 +7855,8 @@
         </p:nvSpPr>
         <p:spPr>
           <a:xfrm>
-            <a:off x="1196752" y="899592"/>
-            <a:ext cx="4680520" cy="461665"/>
+            <a:off x="27384" y="467544"/>
+            <a:ext cx="6858000" cy="830997"/>
           </a:xfrm>
           <a:prstGeom prst="rect">
             <a:avLst/>
@@ -7431,11 +7869,67 @@
           </a:bodyPr>
           <a:lstStyle/>
           <a:p>
+            <a:pPr algn="ctr"/>
             <a:r>
               <a:rPr kumimoji="1" lang="ja-JP" altLang="en-US" sz="2400" b="1" dirty="0" smtClean="0"/>
-              <a:t>以下のフレーズが見つかりました。</a:t>
-            </a:r>
-            <a:endParaRPr kumimoji="1" lang="ja-JP" altLang="en-US" sz="2400" b="1" dirty="0"/>
+              <a:t>以下のフレーズが見つかりました</a:t>
+            </a:r>
+            <a:r>
+              <a:rPr kumimoji="1" lang="ja-JP" altLang="en-US" sz="2400" b="1" dirty="0" smtClean="0"/>
+              <a:t>。</a:t>
+            </a:r>
+            <a:r>
+              <a:rPr kumimoji="1" lang="en-US" altLang="ja-JP" sz="2400" b="1" dirty="0" smtClean="0"/>
+              <a:t/>
+            </a:r>
+            <a:br>
+              <a:rPr kumimoji="1" lang="en-US" altLang="ja-JP" sz="2400" b="1" dirty="0" smtClean="0"/>
+            </a:br>
+            <a:r>
+              <a:rPr kumimoji="1" lang="ja-JP" altLang="en-US" sz="2400" b="1" dirty="0" smtClean="0">
+                <a:solidFill>
+                  <a:srgbClr val="93CDDD"/>
+                </a:solidFill>
+              </a:rPr>
+              <a:t>■</a:t>
+            </a:r>
+            <a:r>
+              <a:rPr kumimoji="1" lang="ja-JP" altLang="en-US" sz="2400" b="1" dirty="0" smtClean="0"/>
+              <a:t>登録　</a:t>
+            </a:r>
+            <a:r>
+              <a:rPr kumimoji="1" lang="ja-JP" altLang="en-US" sz="2400" b="1" dirty="0" smtClean="0">
+                <a:solidFill>
+                  <a:schemeClr val="accent5">
+                    <a:lumMod val="75000"/>
+                  </a:schemeClr>
+                </a:solidFill>
+              </a:rPr>
+              <a:t>■</a:t>
+            </a:r>
+            <a:r>
+              <a:rPr kumimoji="1" lang="ja-JP" altLang="en-US" sz="2400" b="1" dirty="0" smtClean="0"/>
+              <a:t>登録しない</a:t>
+            </a:r>
+            <a:r>
+              <a:rPr kumimoji="1" lang="en-US" altLang="ja-JP" sz="2400" b="1" dirty="0" smtClean="0"/>
+              <a:t>(</a:t>
+            </a:r>
+            <a:r>
+              <a:rPr kumimoji="1" lang="ja-JP" altLang="en-US" sz="2400" b="1" dirty="0" smtClean="0"/>
+              <a:t>タップすると切り替わります</a:t>
+            </a:r>
+            <a:r>
+              <a:rPr kumimoji="1" lang="en-US" altLang="ja-JP" sz="2400" b="1" dirty="0" smtClean="0"/>
+              <a:t>)</a:t>
+            </a:r>
+            <a:endParaRPr kumimoji="1" lang="ja-JP" altLang="en-US" sz="2400" b="1" dirty="0">
+              <a:solidFill>
+                <a:schemeClr val="accent5">
+                  <a:lumMod val="75000"/>
+                </a:schemeClr>
+              </a:solidFill>
+            </a:endParaRPr>
           </a:p>
         </p:txBody>
       </p:sp>
@@ -7448,6 +7942,45 @@
         <p:spPr>
           <a:xfrm>
             <a:off x="692696" y="1619672"/>
+            <a:ext cx="1656184" cy="576064"/>
+          </a:xfrm>
+          <a:prstGeom prst="roundRect">
+            <a:avLst/>
+          </a:prstGeom>
+          <a:solidFill>
+            <a:srgbClr val="93CDDD"/>
+          </a:solidFill>
+          <a:ln>
+            <a:noFill/>
+          </a:ln>
+        </p:spPr>
+        <p:txBody>
+          <a:bodyPr wrap="square" rtlCol="0">
+            <a:noAutofit/>
+          </a:bodyPr>
+          <a:lstStyle/>
+          <a:p>
+            <a:r>
+              <a:rPr kumimoji="1" lang="ja-JP" altLang="en-US" sz="2400" dirty="0" smtClean="0"/>
+              <a:t>～～</a:t>
+            </a:r>
+            <a:r>
+              <a:rPr kumimoji="1" lang="ja-JP" altLang="en-US" sz="2400" dirty="0" smtClean="0"/>
+              <a:t>～</a:t>
+            </a:r>
+            <a:endParaRPr kumimoji="1" lang="ja-JP" altLang="en-US" sz="2400" dirty="0"/>
+          </a:p>
+        </p:txBody>
+      </p:sp>
+      <p:sp>
+        <p:nvSpPr>
+          <p:cNvPr id="14" name="テキスト ボックス 13"/>
+          <p:cNvSpPr txBox="1"/>
+          <p:nvPr/>
+        </p:nvSpPr>
+        <p:spPr>
+          <a:xfrm>
+            <a:off x="2492896" y="1619672"/>
             <a:ext cx="1656184" cy="576064"/>
           </a:xfrm>
           <a:prstGeom prst="roundRect">
@@ -7477,56 +8010,6 @@
               <a:rPr kumimoji="1" lang="ja-JP" altLang="en-US" sz="2400" dirty="0" smtClean="0"/>
               <a:t>～</a:t>
             </a:r>
-            <a:r>
-              <a:rPr kumimoji="1" lang="en-US" altLang="ja-JP" sz="2400" dirty="0" smtClean="0"/>
-              <a:t>×</a:t>
-            </a:r>
-            <a:endParaRPr kumimoji="1" lang="ja-JP" altLang="en-US" sz="2400" dirty="0"/>
-          </a:p>
-        </p:txBody>
-      </p:sp>
-      <p:sp>
-        <p:nvSpPr>
-          <p:cNvPr id="14" name="テキスト ボックス 13"/>
-          <p:cNvSpPr txBox="1"/>
-          <p:nvPr/>
-        </p:nvSpPr>
-        <p:spPr>
-          <a:xfrm>
-            <a:off x="2492896" y="1619672"/>
-            <a:ext cx="1656184" cy="576064"/>
-          </a:xfrm>
-          <a:prstGeom prst="roundRect">
-            <a:avLst/>
-          </a:prstGeom>
-          <a:solidFill>
-            <a:schemeClr val="accent5">
-              <a:lumMod val="60000"/>
-              <a:lumOff val="40000"/>
-            </a:schemeClr>
-          </a:solidFill>
-          <a:ln>
-            <a:noFill/>
-          </a:ln>
-        </p:spPr>
-        <p:txBody>
-          <a:bodyPr wrap="square" rtlCol="0">
-            <a:noAutofit/>
-          </a:bodyPr>
-          <a:lstStyle/>
-          <a:p>
-            <a:r>
-              <a:rPr kumimoji="1" lang="ja-JP" altLang="en-US" sz="2400" dirty="0" smtClean="0"/>
-              <a:t>～～</a:t>
-            </a:r>
-            <a:r>
-              <a:rPr kumimoji="1" lang="ja-JP" altLang="en-US" sz="2400" dirty="0" smtClean="0"/>
-              <a:t>～</a:t>
-            </a:r>
-            <a:r>
-              <a:rPr kumimoji="1" lang="en-US" altLang="ja-JP" sz="2400" dirty="0" smtClean="0"/>
-              <a:t>×</a:t>
-            </a:r>
             <a:endParaRPr kumimoji="1" lang="ja-JP" altLang="en-US" sz="2400" dirty="0"/>
           </a:p>
         </p:txBody>
@@ -7567,17 +8050,6 @@
             <a:r>
               <a:rPr kumimoji="1" lang="ja-JP" altLang="en-US" sz="2400" dirty="0" smtClean="0"/>
               <a:t>～</a:t>
-            </a:r>
-            <a:r>
-              <a:rPr lang="ja-JP" altLang="en-US" sz="2400" dirty="0" smtClean="0">
-                <a:solidFill>
-                  <a:schemeClr val="accent2">
-                    <a:lumMod val="60000"/>
-                    <a:lumOff val="40000"/>
-                  </a:schemeClr>
-                </a:solidFill>
-              </a:rPr>
-              <a:t>＋</a:t>
             </a:r>
             <a:endParaRPr kumimoji="1" lang="ja-JP" altLang="en-US" sz="2400" dirty="0">
               <a:solidFill>
@@ -7622,6 +8094,1645 @@
           <a:chExt cx="0" cy="0"/>
         </a:xfrm>
       </p:grpSpPr>
+      <p:sp>
+        <p:nvSpPr>
+          <p:cNvPr id="36" name="正方形/長方形 35"/>
+          <p:cNvSpPr/>
+          <p:nvPr/>
+        </p:nvSpPr>
+        <p:spPr>
+          <a:xfrm>
+            <a:off x="2204864" y="7956376"/>
+            <a:ext cx="2736304" cy="936104"/>
+          </a:xfrm>
+          <a:prstGeom prst="rect">
+            <a:avLst/>
+          </a:prstGeom>
+          <a:blipFill>
+            <a:blip r:embed="rId3" cstate="print"/>
+            <a:stretch>
+              <a:fillRect/>
+            </a:stretch>
+          </a:blipFill>
+          <a:ln>
+            <a:noFill/>
+          </a:ln>
+        </p:spPr>
+        <p:style>
+          <a:lnRef idx="2">
+            <a:schemeClr val="accent1">
+              <a:shade val="50000"/>
+            </a:schemeClr>
+          </a:lnRef>
+          <a:fillRef idx="1">
+            <a:schemeClr val="accent1"/>
+          </a:fillRef>
+          <a:effectRef idx="0">
+            <a:schemeClr val="accent1"/>
+          </a:effectRef>
+          <a:fontRef idx="minor">
+            <a:schemeClr val="lt1"/>
+          </a:fontRef>
+        </p:style>
+        <p:txBody>
+          <a:bodyPr rtlCol="0" anchor="ctr"/>
+          <a:lstStyle/>
+          <a:p>
+            <a:pPr algn="ctr"/>
+            <a:r>
+              <a:rPr lang="en-US" altLang="ja-JP" sz="3600" dirty="0" smtClean="0"/>
+              <a:t>OK</a:t>
+            </a:r>
+            <a:endParaRPr kumimoji="1" lang="ja-JP" altLang="en-US" sz="3600" dirty="0"/>
+          </a:p>
+        </p:txBody>
+      </p:sp>
+      <p:sp>
+        <p:nvSpPr>
+          <p:cNvPr id="22" name="テキスト ボックス 21"/>
+          <p:cNvSpPr txBox="1"/>
+          <p:nvPr/>
+        </p:nvSpPr>
+        <p:spPr>
+          <a:xfrm>
+            <a:off x="692696" y="179512"/>
+            <a:ext cx="5661248" cy="461665"/>
+          </a:xfrm>
+          <a:prstGeom prst="rect">
+            <a:avLst/>
+          </a:prstGeom>
+          <a:noFill/>
+        </p:spPr>
+        <p:txBody>
+          <a:bodyPr wrap="square" rtlCol="0">
+            <a:spAutoFit/>
+          </a:bodyPr>
+          <a:lstStyle/>
+          <a:p>
+            <a:r>
+              <a:rPr lang="ja-JP" altLang="en-US" sz="2400" b="1" dirty="0" smtClean="0"/>
+              <a:t>どのアカウントから話題をさがしますか</a:t>
+            </a:r>
+            <a:r>
+              <a:rPr lang="en-US" altLang="ja-JP" sz="2400" b="1" dirty="0" smtClean="0"/>
+              <a:t>?</a:t>
+            </a:r>
+            <a:endParaRPr kumimoji="1" lang="ja-JP" altLang="en-US" sz="2400" b="1" dirty="0"/>
+          </a:p>
+        </p:txBody>
+      </p:sp>
+      <p:sp>
+        <p:nvSpPr>
+          <p:cNvPr id="32" name="正方形/長方形 31"/>
+          <p:cNvSpPr/>
+          <p:nvPr/>
+        </p:nvSpPr>
+        <p:spPr>
+          <a:xfrm>
+            <a:off x="404664" y="2699792"/>
+            <a:ext cx="692696" cy="720080"/>
+          </a:xfrm>
+          <a:prstGeom prst="rect">
+            <a:avLst/>
+          </a:prstGeom>
+          <a:blipFill>
+            <a:blip r:embed="rId4" cstate="print"/>
+            <a:stretch>
+              <a:fillRect/>
+            </a:stretch>
+          </a:blipFill>
+          <a:ln>
+            <a:noFill/>
+          </a:ln>
+        </p:spPr>
+        <p:style>
+          <a:lnRef idx="2">
+            <a:schemeClr val="accent1">
+              <a:shade val="50000"/>
+            </a:schemeClr>
+          </a:lnRef>
+          <a:fillRef idx="1">
+            <a:schemeClr val="accent1"/>
+          </a:fillRef>
+          <a:effectRef idx="0">
+            <a:schemeClr val="accent1"/>
+          </a:effectRef>
+          <a:fontRef idx="minor">
+            <a:schemeClr val="lt1"/>
+          </a:fontRef>
+        </p:style>
+        <p:txBody>
+          <a:bodyPr rtlCol="0" anchor="ctr"/>
+          <a:lstStyle/>
+          <a:p>
+            <a:pPr algn="ctr"/>
+            <a:r>
+              <a:rPr kumimoji="1" lang="en-US" altLang="ja-JP" dirty="0" smtClean="0"/>
+              <a:t>FB</a:t>
+            </a:r>
+          </a:p>
+          <a:p>
+            <a:pPr algn="ctr"/>
+            <a:r>
+              <a:rPr kumimoji="1" lang="ja-JP" altLang="en-US" dirty="0" smtClean="0"/>
+              <a:t>ロゴ</a:t>
+            </a:r>
+            <a:endParaRPr kumimoji="1" lang="ja-JP" altLang="en-US" dirty="0"/>
+          </a:p>
+        </p:txBody>
+      </p:sp>
+      <p:sp>
+        <p:nvSpPr>
+          <p:cNvPr id="33" name="正方形/長方形 32"/>
+          <p:cNvSpPr/>
+          <p:nvPr/>
+        </p:nvSpPr>
+        <p:spPr>
+          <a:xfrm>
+            <a:off x="432048" y="1115616"/>
+            <a:ext cx="620688" cy="648072"/>
+          </a:xfrm>
+          <a:prstGeom prst="rect">
+            <a:avLst/>
+          </a:prstGeom>
+          <a:blipFill>
+            <a:blip r:embed="rId5" cstate="print"/>
+            <a:stretch>
+              <a:fillRect/>
+            </a:stretch>
+          </a:blipFill>
+          <a:ln>
+            <a:noFill/>
+          </a:ln>
+        </p:spPr>
+        <p:style>
+          <a:lnRef idx="2">
+            <a:schemeClr val="accent1">
+              <a:shade val="50000"/>
+            </a:schemeClr>
+          </a:lnRef>
+          <a:fillRef idx="1">
+            <a:schemeClr val="accent1"/>
+          </a:fillRef>
+          <a:effectRef idx="0">
+            <a:schemeClr val="accent1"/>
+          </a:effectRef>
+          <a:fontRef idx="minor">
+            <a:schemeClr val="lt1"/>
+          </a:fontRef>
+        </p:style>
+        <p:txBody>
+          <a:bodyPr rtlCol="0" anchor="ctr"/>
+          <a:lstStyle/>
+          <a:p>
+            <a:pPr algn="ctr"/>
+            <a:r>
+              <a:rPr kumimoji="1" lang="en-US" altLang="ja-JP" dirty="0" smtClean="0"/>
+              <a:t>TW</a:t>
+            </a:r>
+          </a:p>
+          <a:p>
+            <a:pPr algn="ctr"/>
+            <a:r>
+              <a:rPr lang="ja-JP" altLang="en-US" dirty="0" smtClean="0"/>
+              <a:t>ロゴ</a:t>
+            </a:r>
+            <a:endParaRPr kumimoji="1" lang="ja-JP" altLang="en-US" dirty="0"/>
+          </a:p>
+        </p:txBody>
+      </p:sp>
+      <p:sp>
+        <p:nvSpPr>
+          <p:cNvPr id="39" name="正方形/長方形 38"/>
+          <p:cNvSpPr/>
+          <p:nvPr/>
+        </p:nvSpPr>
+        <p:spPr>
+          <a:xfrm>
+            <a:off x="1484784" y="6300192"/>
+            <a:ext cx="1368152" cy="1224136"/>
+          </a:xfrm>
+          <a:prstGeom prst="rect">
+            <a:avLst/>
+          </a:prstGeom>
+        </p:spPr>
+        <p:style>
+          <a:lnRef idx="2">
+            <a:schemeClr val="accent1">
+              <a:shade val="50000"/>
+            </a:schemeClr>
+          </a:lnRef>
+          <a:fillRef idx="1">
+            <a:schemeClr val="accent1"/>
+          </a:fillRef>
+          <a:effectRef idx="0">
+            <a:schemeClr val="accent1"/>
+          </a:effectRef>
+          <a:fontRef idx="minor">
+            <a:schemeClr val="lt1"/>
+          </a:fontRef>
+        </p:style>
+        <p:txBody>
+          <a:bodyPr rtlCol="0" anchor="ctr"/>
+          <a:lstStyle/>
+          <a:p>
+            <a:pPr algn="ctr"/>
+            <a:r>
+              <a:rPr kumimoji="1" lang="ja-JP" altLang="en-US" dirty="0" smtClean="0"/>
+              <a:t>アカウント</a:t>
+            </a:r>
+            <a:endParaRPr kumimoji="1" lang="en-US" altLang="ja-JP" dirty="0" smtClean="0"/>
+          </a:p>
+          <a:p>
+            <a:pPr algn="ctr"/>
+            <a:r>
+              <a:rPr lang="ja-JP" altLang="en-US" dirty="0" smtClean="0"/>
+              <a:t>プロフィール画像</a:t>
+            </a:r>
+            <a:endParaRPr kumimoji="1" lang="ja-JP" altLang="en-US" dirty="0"/>
+          </a:p>
+        </p:txBody>
+      </p:sp>
+      <p:sp>
+        <p:nvSpPr>
+          <p:cNvPr id="40" name="正方形/長方形 39"/>
+          <p:cNvSpPr/>
+          <p:nvPr/>
+        </p:nvSpPr>
+        <p:spPr>
+          <a:xfrm>
+            <a:off x="1484784" y="4644008"/>
+            <a:ext cx="1368152" cy="1224136"/>
+          </a:xfrm>
+          <a:prstGeom prst="rect">
+            <a:avLst/>
+          </a:prstGeom>
+        </p:spPr>
+        <p:style>
+          <a:lnRef idx="2">
+            <a:schemeClr val="accent1">
+              <a:shade val="50000"/>
+            </a:schemeClr>
+          </a:lnRef>
+          <a:fillRef idx="1">
+            <a:schemeClr val="accent1"/>
+          </a:fillRef>
+          <a:effectRef idx="0">
+            <a:schemeClr val="accent1"/>
+          </a:effectRef>
+          <a:fontRef idx="minor">
+            <a:schemeClr val="lt1"/>
+          </a:fontRef>
+        </p:style>
+        <p:txBody>
+          <a:bodyPr rtlCol="0" anchor="ctr"/>
+          <a:lstStyle/>
+          <a:p>
+            <a:pPr algn="ctr"/>
+            <a:r>
+              <a:rPr kumimoji="1" lang="ja-JP" altLang="en-US" dirty="0" smtClean="0"/>
+              <a:t>アカウント</a:t>
+            </a:r>
+            <a:endParaRPr kumimoji="1" lang="en-US" altLang="ja-JP" dirty="0" smtClean="0"/>
+          </a:p>
+          <a:p>
+            <a:pPr algn="ctr"/>
+            <a:r>
+              <a:rPr lang="ja-JP" altLang="en-US" dirty="0" smtClean="0"/>
+              <a:t>プロフィール画像</a:t>
+            </a:r>
+            <a:endParaRPr kumimoji="1" lang="ja-JP" altLang="en-US" dirty="0"/>
+          </a:p>
+        </p:txBody>
+      </p:sp>
+      <p:sp>
+        <p:nvSpPr>
+          <p:cNvPr id="46" name="正方形/長方形 45"/>
+          <p:cNvSpPr/>
+          <p:nvPr/>
+        </p:nvSpPr>
+        <p:spPr>
+          <a:xfrm>
+            <a:off x="1340768" y="2843808"/>
+            <a:ext cx="1872208" cy="1440160"/>
+          </a:xfrm>
+          <a:prstGeom prst="rect">
+            <a:avLst/>
+          </a:prstGeom>
+          <a:solidFill>
+            <a:schemeClr val="tx2">
+              <a:lumMod val="20000"/>
+              <a:lumOff val="80000"/>
+            </a:schemeClr>
+          </a:solidFill>
+          <a:ln>
+            <a:noFill/>
+          </a:ln>
+        </p:spPr>
+        <p:style>
+          <a:lnRef idx="2">
+            <a:schemeClr val="accent1">
+              <a:shade val="50000"/>
+            </a:schemeClr>
+          </a:lnRef>
+          <a:fillRef idx="1">
+            <a:schemeClr val="accent1"/>
+          </a:fillRef>
+          <a:effectRef idx="0">
+            <a:schemeClr val="accent1"/>
+          </a:effectRef>
+          <a:fontRef idx="minor">
+            <a:schemeClr val="lt1"/>
+          </a:fontRef>
+        </p:style>
+        <p:txBody>
+          <a:bodyPr rtlCol="0" anchor="ctr"/>
+          <a:lstStyle/>
+          <a:p>
+            <a:pPr algn="ctr"/>
+            <a:endParaRPr kumimoji="1" lang="ja-JP" altLang="en-US" dirty="0">
+              <a:solidFill>
+                <a:schemeClr val="accent1">
+                  <a:lumMod val="20000"/>
+                  <a:lumOff val="80000"/>
+                </a:schemeClr>
+              </a:solidFill>
+            </a:endParaRPr>
+          </a:p>
+        </p:txBody>
+      </p:sp>
+      <p:sp>
+        <p:nvSpPr>
+          <p:cNvPr id="44" name="円形吹き出し 43"/>
+          <p:cNvSpPr/>
+          <p:nvPr/>
+        </p:nvSpPr>
+        <p:spPr>
+          <a:xfrm>
+            <a:off x="-4347864" y="6804248"/>
+            <a:ext cx="3456384" cy="1296144"/>
+          </a:xfrm>
+          <a:prstGeom prst="wedgeEllipseCallout">
+            <a:avLst>
+              <a:gd name="adj1" fmla="val 111169"/>
+              <a:gd name="adj2" fmla="val -21275"/>
+            </a:avLst>
+          </a:prstGeom>
+          <a:solidFill>
+            <a:schemeClr val="tx2">
+              <a:lumMod val="20000"/>
+              <a:lumOff val="80000"/>
+            </a:schemeClr>
+          </a:solidFill>
+          <a:ln>
+            <a:noFill/>
+          </a:ln>
+        </p:spPr>
+        <p:style>
+          <a:lnRef idx="2">
+            <a:schemeClr val="accent1">
+              <a:shade val="50000"/>
+            </a:schemeClr>
+          </a:lnRef>
+          <a:fillRef idx="1">
+            <a:schemeClr val="accent1"/>
+          </a:fillRef>
+          <a:effectRef idx="0">
+            <a:schemeClr val="accent1"/>
+          </a:effectRef>
+          <a:fontRef idx="minor">
+            <a:schemeClr val="lt1"/>
+          </a:fontRef>
+        </p:style>
+        <p:txBody>
+          <a:bodyPr rtlCol="0" anchor="ctr"/>
+          <a:lstStyle/>
+          <a:p>
+            <a:pPr algn="ctr"/>
+            <a:r>
+              <a:rPr kumimoji="1" lang="ja-JP" altLang="en-US" dirty="0" smtClean="0">
+                <a:solidFill>
+                  <a:schemeClr val="tx1"/>
+                </a:solidFill>
+              </a:rPr>
+              <a:t>もしたくさん居たら</a:t>
+            </a:r>
+            <a:endParaRPr kumimoji="1" lang="en-US" altLang="ja-JP" dirty="0" smtClean="0">
+              <a:solidFill>
+                <a:schemeClr val="tx1"/>
+              </a:solidFill>
+            </a:endParaRPr>
+          </a:p>
+          <a:p>
+            <a:pPr algn="ctr"/>
+            <a:r>
+              <a:rPr lang="ja-JP" altLang="en-US" dirty="0" smtClean="0">
+                <a:solidFill>
+                  <a:schemeClr val="tx1"/>
+                </a:solidFill>
+              </a:rPr>
+              <a:t>縦</a:t>
+            </a:r>
+            <a:r>
+              <a:rPr kumimoji="1" lang="ja-JP" altLang="en-US" dirty="0" smtClean="0">
+                <a:solidFill>
+                  <a:schemeClr val="tx1"/>
+                </a:solidFill>
+              </a:rPr>
+              <a:t>にスクロール</a:t>
+            </a:r>
+            <a:endParaRPr kumimoji="1" lang="ja-JP" altLang="en-US" dirty="0">
+              <a:solidFill>
+                <a:schemeClr val="tx1"/>
+              </a:solidFill>
+            </a:endParaRPr>
+          </a:p>
+        </p:txBody>
+      </p:sp>
+      <p:sp>
+        <p:nvSpPr>
+          <p:cNvPr id="45" name="円形吹き出し 44"/>
+          <p:cNvSpPr/>
+          <p:nvPr/>
+        </p:nvSpPr>
+        <p:spPr>
+          <a:xfrm>
+            <a:off x="-3555776" y="899592"/>
+            <a:ext cx="2664296" cy="1872208"/>
+          </a:xfrm>
+          <a:prstGeom prst="wedgeEllipseCallout">
+            <a:avLst>
+              <a:gd name="adj1" fmla="val 86410"/>
+              <a:gd name="adj2" fmla="val -9066"/>
+            </a:avLst>
+          </a:prstGeom>
+          <a:solidFill>
+            <a:schemeClr val="tx2">
+              <a:lumMod val="20000"/>
+              <a:lumOff val="80000"/>
+            </a:schemeClr>
+          </a:solidFill>
+          <a:ln>
+            <a:noFill/>
+          </a:ln>
+        </p:spPr>
+        <p:style>
+          <a:lnRef idx="2">
+            <a:schemeClr val="accent1">
+              <a:shade val="50000"/>
+            </a:schemeClr>
+          </a:lnRef>
+          <a:fillRef idx="1">
+            <a:schemeClr val="accent1"/>
+          </a:fillRef>
+          <a:effectRef idx="0">
+            <a:schemeClr val="accent1"/>
+          </a:effectRef>
+          <a:fontRef idx="minor">
+            <a:schemeClr val="lt1"/>
+          </a:fontRef>
+        </p:style>
+        <p:txBody>
+          <a:bodyPr rtlCol="0" anchor="ctr"/>
+          <a:lstStyle/>
+          <a:p>
+            <a:pPr algn="ctr"/>
+            <a:r>
+              <a:rPr lang="en-US" altLang="ja-JP" dirty="0" smtClean="0">
+                <a:solidFill>
+                  <a:schemeClr val="tx1"/>
+                </a:solidFill>
+              </a:rPr>
+              <a:t>Twitter</a:t>
+            </a:r>
+            <a:r>
+              <a:rPr lang="ja-JP" altLang="en-US" dirty="0" smtClean="0">
+                <a:solidFill>
+                  <a:schemeClr val="tx1"/>
+                </a:solidFill>
+              </a:rPr>
+              <a:t>見つかった場合は一番上に</a:t>
+            </a:r>
+            <a:endParaRPr lang="en-US" altLang="ja-JP" dirty="0" smtClean="0">
+              <a:solidFill>
+                <a:schemeClr val="tx1"/>
+              </a:solidFill>
+            </a:endParaRPr>
+          </a:p>
+        </p:txBody>
+      </p:sp>
+      <p:sp>
+        <p:nvSpPr>
+          <p:cNvPr id="37" name="正方形/長方形 36"/>
+          <p:cNvSpPr/>
+          <p:nvPr/>
+        </p:nvSpPr>
+        <p:spPr>
+          <a:xfrm>
+            <a:off x="1556792" y="2915816"/>
+            <a:ext cx="1368152" cy="1224136"/>
+          </a:xfrm>
+          <a:prstGeom prst="rect">
+            <a:avLst/>
+          </a:prstGeom>
+        </p:spPr>
+        <p:style>
+          <a:lnRef idx="2">
+            <a:schemeClr val="accent1">
+              <a:shade val="50000"/>
+            </a:schemeClr>
+          </a:lnRef>
+          <a:fillRef idx="1">
+            <a:schemeClr val="accent1"/>
+          </a:fillRef>
+          <a:effectRef idx="0">
+            <a:schemeClr val="accent1"/>
+          </a:effectRef>
+          <a:fontRef idx="minor">
+            <a:schemeClr val="lt1"/>
+          </a:fontRef>
+        </p:style>
+        <p:txBody>
+          <a:bodyPr rtlCol="0" anchor="ctr"/>
+          <a:lstStyle/>
+          <a:p>
+            <a:pPr algn="ctr"/>
+            <a:r>
+              <a:rPr kumimoji="1" lang="ja-JP" altLang="en-US" dirty="0" smtClean="0"/>
+              <a:t>アカウント</a:t>
+            </a:r>
+            <a:endParaRPr kumimoji="1" lang="en-US" altLang="ja-JP" dirty="0" smtClean="0"/>
+          </a:p>
+          <a:p>
+            <a:pPr algn="ctr"/>
+            <a:r>
+              <a:rPr lang="ja-JP" altLang="en-US" dirty="0" smtClean="0"/>
+              <a:t>プロフィール画像</a:t>
+            </a:r>
+            <a:endParaRPr kumimoji="1" lang="ja-JP" altLang="en-US" dirty="0"/>
+          </a:p>
+        </p:txBody>
+      </p:sp>
+      <p:sp>
+        <p:nvSpPr>
+          <p:cNvPr id="47" name="正方形/長方形 46"/>
+          <p:cNvSpPr/>
+          <p:nvPr/>
+        </p:nvSpPr>
+        <p:spPr>
+          <a:xfrm>
+            <a:off x="1556792" y="1259632"/>
+            <a:ext cx="1368152" cy="1224136"/>
+          </a:xfrm>
+          <a:prstGeom prst="rect">
+            <a:avLst/>
+          </a:prstGeom>
+        </p:spPr>
+        <p:style>
+          <a:lnRef idx="2">
+            <a:schemeClr val="accent1">
+              <a:shade val="50000"/>
+            </a:schemeClr>
+          </a:lnRef>
+          <a:fillRef idx="1">
+            <a:schemeClr val="accent1"/>
+          </a:fillRef>
+          <a:effectRef idx="0">
+            <a:schemeClr val="accent1"/>
+          </a:effectRef>
+          <a:fontRef idx="minor">
+            <a:schemeClr val="lt1"/>
+          </a:fontRef>
+        </p:style>
+        <p:txBody>
+          <a:bodyPr rtlCol="0" anchor="ctr"/>
+          <a:lstStyle/>
+          <a:p>
+            <a:pPr algn="ctr"/>
+            <a:r>
+              <a:rPr kumimoji="1" lang="ja-JP" altLang="en-US" dirty="0" smtClean="0"/>
+              <a:t>アカウント</a:t>
+            </a:r>
+            <a:endParaRPr kumimoji="1" lang="en-US" altLang="ja-JP" dirty="0" smtClean="0"/>
+          </a:p>
+          <a:p>
+            <a:pPr algn="ctr"/>
+            <a:r>
+              <a:rPr lang="ja-JP" altLang="en-US" dirty="0" smtClean="0"/>
+              <a:t>プロフィール画像</a:t>
+            </a:r>
+            <a:endParaRPr kumimoji="1" lang="ja-JP" altLang="en-US" dirty="0"/>
+          </a:p>
+        </p:txBody>
+      </p:sp>
+      <p:sp>
+        <p:nvSpPr>
+          <p:cNvPr id="19" name="正方形/長方形 18"/>
+          <p:cNvSpPr/>
+          <p:nvPr/>
+        </p:nvSpPr>
+        <p:spPr>
+          <a:xfrm>
+            <a:off x="260648" y="971600"/>
+            <a:ext cx="6192688" cy="1656184"/>
+          </a:xfrm>
+          <a:prstGeom prst="rect">
+            <a:avLst/>
+          </a:prstGeom>
+          <a:noFill/>
+          <a:ln>
+            <a:solidFill>
+              <a:schemeClr val="bg1"/>
+            </a:solidFill>
+          </a:ln>
+        </p:spPr>
+        <p:style>
+          <a:lnRef idx="2">
+            <a:schemeClr val="accent1">
+              <a:shade val="50000"/>
+            </a:schemeClr>
+          </a:lnRef>
+          <a:fillRef idx="1">
+            <a:schemeClr val="accent1"/>
+          </a:fillRef>
+          <a:effectRef idx="0">
+            <a:schemeClr val="accent1"/>
+          </a:effectRef>
+          <a:fontRef idx="minor">
+            <a:schemeClr val="lt1"/>
+          </a:fontRef>
+        </p:style>
+        <p:txBody>
+          <a:bodyPr rtlCol="0" anchor="ctr"/>
+          <a:lstStyle/>
+          <a:p>
+            <a:pPr algn="ctr"/>
+            <a:endParaRPr kumimoji="1" lang="ja-JP" altLang="en-US" dirty="0" smtClean="0"/>
+          </a:p>
+        </p:txBody>
+      </p:sp>
+      <p:sp>
+        <p:nvSpPr>
+          <p:cNvPr id="20" name="円形吹き出し 19"/>
+          <p:cNvSpPr/>
+          <p:nvPr/>
+        </p:nvSpPr>
+        <p:spPr>
+          <a:xfrm>
+            <a:off x="7461448" y="0"/>
+            <a:ext cx="2664296" cy="1872208"/>
+          </a:xfrm>
+          <a:prstGeom prst="wedgeEllipseCallout">
+            <a:avLst>
+              <a:gd name="adj1" fmla="val -85193"/>
+              <a:gd name="adj2" fmla="val 72335"/>
+            </a:avLst>
+          </a:prstGeom>
+          <a:solidFill>
+            <a:schemeClr val="tx2">
+              <a:lumMod val="20000"/>
+              <a:lumOff val="80000"/>
+            </a:schemeClr>
+          </a:solidFill>
+          <a:ln>
+            <a:noFill/>
+          </a:ln>
+        </p:spPr>
+        <p:style>
+          <a:lnRef idx="2">
+            <a:schemeClr val="accent1">
+              <a:shade val="50000"/>
+            </a:schemeClr>
+          </a:lnRef>
+          <a:fillRef idx="1">
+            <a:schemeClr val="accent1"/>
+          </a:fillRef>
+          <a:effectRef idx="0">
+            <a:schemeClr val="accent1"/>
+          </a:effectRef>
+          <a:fontRef idx="minor">
+            <a:schemeClr val="lt1"/>
+          </a:fontRef>
+        </p:style>
+        <p:txBody>
+          <a:bodyPr rtlCol="0" anchor="ctr"/>
+          <a:lstStyle/>
+          <a:p>
+            <a:pPr algn="ctr"/>
+            <a:r>
+              <a:rPr lang="ja-JP" altLang="en-US" dirty="0" smtClean="0">
+                <a:solidFill>
+                  <a:schemeClr val="tx1"/>
+                </a:solidFill>
+              </a:rPr>
+              <a:t>枠</a:t>
+            </a:r>
+            <a:endParaRPr lang="en-US" altLang="ja-JP" dirty="0" smtClean="0">
+              <a:solidFill>
+                <a:schemeClr val="tx1"/>
+              </a:solidFill>
+            </a:endParaRPr>
+          </a:p>
+          <a:p>
+            <a:pPr algn="ctr"/>
+            <a:r>
+              <a:rPr lang="en-US" altLang="ja-JP" dirty="0" smtClean="0">
+                <a:solidFill>
+                  <a:schemeClr val="tx1"/>
+                </a:solidFill>
+              </a:rPr>
+              <a:t>(</a:t>
+            </a:r>
+            <a:r>
+              <a:rPr lang="ja-JP" altLang="en-US" dirty="0" smtClean="0">
+                <a:solidFill>
+                  <a:schemeClr val="tx1"/>
+                </a:solidFill>
+              </a:rPr>
+              <a:t>画像を使いたい</a:t>
+            </a:r>
+            <a:r>
+              <a:rPr lang="en-US" altLang="ja-JP" dirty="0" smtClean="0">
+                <a:solidFill>
+                  <a:schemeClr val="tx1"/>
+                </a:solidFill>
+              </a:rPr>
+              <a:t>)</a:t>
+            </a:r>
+            <a:endParaRPr lang="en-US" altLang="ja-JP" dirty="0" smtClean="0">
+              <a:solidFill>
+                <a:schemeClr val="tx1"/>
+              </a:solidFill>
+            </a:endParaRPr>
+          </a:p>
+        </p:txBody>
+      </p:sp>
+      <p:sp>
+        <p:nvSpPr>
+          <p:cNvPr id="21" name="正方形/長方形 20"/>
+          <p:cNvSpPr/>
+          <p:nvPr/>
+        </p:nvSpPr>
+        <p:spPr>
+          <a:xfrm>
+            <a:off x="260648" y="2699792"/>
+            <a:ext cx="6192688" cy="5040560"/>
+          </a:xfrm>
+          <a:prstGeom prst="rect">
+            <a:avLst/>
+          </a:prstGeom>
+          <a:noFill/>
+          <a:ln>
+            <a:solidFill>
+              <a:schemeClr val="bg1"/>
+            </a:solidFill>
+          </a:ln>
+        </p:spPr>
+        <p:style>
+          <a:lnRef idx="2">
+            <a:schemeClr val="accent1">
+              <a:shade val="50000"/>
+            </a:schemeClr>
+          </a:lnRef>
+          <a:fillRef idx="1">
+            <a:schemeClr val="accent1"/>
+          </a:fillRef>
+          <a:effectRef idx="0">
+            <a:schemeClr val="accent1"/>
+          </a:effectRef>
+          <a:fontRef idx="minor">
+            <a:schemeClr val="lt1"/>
+          </a:fontRef>
+        </p:style>
+        <p:txBody>
+          <a:bodyPr rtlCol="0" anchor="ctr"/>
+          <a:lstStyle/>
+          <a:p>
+            <a:pPr algn="ctr"/>
+            <a:endParaRPr kumimoji="1" lang="ja-JP" altLang="en-US" dirty="0" smtClean="0"/>
+          </a:p>
+        </p:txBody>
+      </p:sp>
+      <p:sp>
+        <p:nvSpPr>
+          <p:cNvPr id="23" name="正方形/長方形 22"/>
+          <p:cNvSpPr/>
+          <p:nvPr/>
+        </p:nvSpPr>
+        <p:spPr>
+          <a:xfrm>
+            <a:off x="6237312" y="2699792"/>
+            <a:ext cx="188640" cy="4968552"/>
+          </a:xfrm>
+          <a:prstGeom prst="rect">
+            <a:avLst/>
+          </a:prstGeom>
+          <a:solidFill>
+            <a:schemeClr val="bg1"/>
+          </a:solidFill>
+        </p:spPr>
+        <p:style>
+          <a:lnRef idx="2">
+            <a:schemeClr val="accent1">
+              <a:shade val="50000"/>
+            </a:schemeClr>
+          </a:lnRef>
+          <a:fillRef idx="1">
+            <a:schemeClr val="accent1"/>
+          </a:fillRef>
+          <a:effectRef idx="0">
+            <a:schemeClr val="accent1"/>
+          </a:effectRef>
+          <a:fontRef idx="minor">
+            <a:schemeClr val="lt1"/>
+          </a:fontRef>
+        </p:style>
+        <p:txBody>
+          <a:bodyPr rtlCol="0" anchor="ctr"/>
+          <a:lstStyle/>
+          <a:p>
+            <a:pPr algn="ctr"/>
+            <a:endParaRPr kumimoji="1" lang="ja-JP" altLang="en-US"/>
+          </a:p>
+        </p:txBody>
+      </p:sp>
+      <p:sp>
+        <p:nvSpPr>
+          <p:cNvPr id="24" name="円/楕円 23"/>
+          <p:cNvSpPr/>
+          <p:nvPr/>
+        </p:nvSpPr>
+        <p:spPr>
+          <a:xfrm>
+            <a:off x="6165304" y="2771800"/>
+            <a:ext cx="312688" cy="258122"/>
+          </a:xfrm>
+          <a:prstGeom prst="ellipse">
+            <a:avLst/>
+          </a:prstGeom>
+          <a:solidFill>
+            <a:schemeClr val="tx1">
+              <a:lumMod val="50000"/>
+              <a:lumOff val="50000"/>
+            </a:schemeClr>
+          </a:solidFill>
+          <a:ln>
+            <a:noFill/>
+          </a:ln>
+        </p:spPr>
+        <p:style>
+          <a:lnRef idx="2">
+            <a:schemeClr val="accent1">
+              <a:shade val="50000"/>
+            </a:schemeClr>
+          </a:lnRef>
+          <a:fillRef idx="1">
+            <a:schemeClr val="accent1"/>
+          </a:fillRef>
+          <a:effectRef idx="0">
+            <a:schemeClr val="accent1"/>
+          </a:effectRef>
+          <a:fontRef idx="minor">
+            <a:schemeClr val="lt1"/>
+          </a:fontRef>
+        </p:style>
+        <p:txBody>
+          <a:bodyPr rtlCol="0" anchor="ctr"/>
+          <a:lstStyle/>
+          <a:p>
+            <a:pPr algn="ctr"/>
+            <a:endParaRPr kumimoji="1" lang="ja-JP" altLang="en-US"/>
+          </a:p>
+        </p:txBody>
+      </p:sp>
+      <p:sp>
+        <p:nvSpPr>
+          <p:cNvPr id="25" name="円形吹き出し 24"/>
+          <p:cNvSpPr/>
+          <p:nvPr/>
+        </p:nvSpPr>
+        <p:spPr>
+          <a:xfrm>
+            <a:off x="7749480" y="2195736"/>
+            <a:ext cx="2664296" cy="1872208"/>
+          </a:xfrm>
+          <a:prstGeom prst="wedgeEllipseCallout">
+            <a:avLst>
+              <a:gd name="adj1" fmla="val -94488"/>
+              <a:gd name="adj2" fmla="val -2961"/>
+            </a:avLst>
+          </a:prstGeom>
+          <a:solidFill>
+            <a:schemeClr val="tx2">
+              <a:lumMod val="20000"/>
+              <a:lumOff val="80000"/>
+            </a:schemeClr>
+          </a:solidFill>
+          <a:ln>
+            <a:noFill/>
+          </a:ln>
+        </p:spPr>
+        <p:style>
+          <a:lnRef idx="2">
+            <a:schemeClr val="accent1">
+              <a:shade val="50000"/>
+            </a:schemeClr>
+          </a:lnRef>
+          <a:fillRef idx="1">
+            <a:schemeClr val="accent1"/>
+          </a:fillRef>
+          <a:effectRef idx="0">
+            <a:schemeClr val="accent1"/>
+          </a:effectRef>
+          <a:fontRef idx="minor">
+            <a:schemeClr val="lt1"/>
+          </a:fontRef>
+        </p:style>
+        <p:txBody>
+          <a:bodyPr rtlCol="0" anchor="ctr"/>
+          <a:lstStyle/>
+          <a:p>
+            <a:pPr algn="ctr"/>
+            <a:r>
+              <a:rPr lang="ja-JP" altLang="en-US" dirty="0" smtClean="0">
+                <a:solidFill>
+                  <a:schemeClr val="tx1"/>
+                </a:solidFill>
+              </a:rPr>
+              <a:t>スクロールバー</a:t>
+            </a:r>
+            <a:endParaRPr lang="en-US" altLang="ja-JP" dirty="0" smtClean="0">
+              <a:solidFill>
+                <a:schemeClr val="tx1"/>
+              </a:solidFill>
+            </a:endParaRPr>
+          </a:p>
+        </p:txBody>
+      </p:sp>
+      <p:sp>
+        <p:nvSpPr>
+          <p:cNvPr id="26" name="円形吹き出し 25"/>
+          <p:cNvSpPr/>
+          <p:nvPr/>
+        </p:nvSpPr>
+        <p:spPr>
+          <a:xfrm>
+            <a:off x="-4419872" y="8495928"/>
+            <a:ext cx="3456384" cy="1296144"/>
+          </a:xfrm>
+          <a:prstGeom prst="wedgeEllipseCallout">
+            <a:avLst>
+              <a:gd name="adj1" fmla="val 89674"/>
+              <a:gd name="adj2" fmla="val 31636"/>
+            </a:avLst>
+          </a:prstGeom>
+          <a:solidFill>
+            <a:schemeClr val="tx2">
+              <a:lumMod val="20000"/>
+              <a:lumOff val="80000"/>
+            </a:schemeClr>
+          </a:solidFill>
+          <a:ln>
+            <a:noFill/>
+          </a:ln>
+        </p:spPr>
+        <p:style>
+          <a:lnRef idx="2">
+            <a:schemeClr val="accent1">
+              <a:shade val="50000"/>
+            </a:schemeClr>
+          </a:lnRef>
+          <a:fillRef idx="1">
+            <a:schemeClr val="accent1"/>
+          </a:fillRef>
+          <a:effectRef idx="0">
+            <a:schemeClr val="accent1"/>
+          </a:effectRef>
+          <a:fontRef idx="minor">
+            <a:schemeClr val="lt1"/>
+          </a:fontRef>
+        </p:style>
+        <p:txBody>
+          <a:bodyPr rtlCol="0" anchor="ctr"/>
+          <a:lstStyle/>
+          <a:p>
+            <a:pPr algn="ctr"/>
+            <a:r>
+              <a:rPr lang="ja-JP" altLang="en-US" dirty="0" smtClean="0">
+                <a:solidFill>
+                  <a:schemeClr val="tx1"/>
+                </a:solidFill>
+              </a:rPr>
+              <a:t>端末の戻るボタンで</a:t>
+            </a:r>
+            <a:endParaRPr lang="en-US" altLang="ja-JP" dirty="0" smtClean="0">
+              <a:solidFill>
+                <a:schemeClr val="tx1"/>
+              </a:solidFill>
+            </a:endParaRPr>
+          </a:p>
+          <a:p>
+            <a:pPr algn="ctr"/>
+            <a:r>
+              <a:rPr kumimoji="1" lang="ja-JP" altLang="en-US" dirty="0" smtClean="0">
+                <a:solidFill>
+                  <a:schemeClr val="tx1"/>
+                </a:solidFill>
+              </a:rPr>
+              <a:t>話題検索画面に戻る</a:t>
+            </a:r>
+            <a:endParaRPr kumimoji="1" lang="en-US" altLang="ja-JP" dirty="0" smtClean="0">
+              <a:solidFill>
+                <a:schemeClr val="tx1"/>
+              </a:solidFill>
+            </a:endParaRPr>
+          </a:p>
+        </p:txBody>
+      </p:sp>
+      <p:sp>
+        <p:nvSpPr>
+          <p:cNvPr id="27" name="正方形/長方形 26"/>
+          <p:cNvSpPr/>
+          <p:nvPr/>
+        </p:nvSpPr>
+        <p:spPr>
+          <a:xfrm>
+            <a:off x="1196752" y="2771800"/>
+            <a:ext cx="4824536" cy="1584176"/>
+          </a:xfrm>
+          <a:prstGeom prst="rect">
+            <a:avLst/>
+          </a:prstGeom>
+          <a:noFill/>
+          <a:ln>
+            <a:solidFill>
+              <a:schemeClr val="tx1"/>
+            </a:solidFill>
+          </a:ln>
+        </p:spPr>
+        <p:style>
+          <a:lnRef idx="2">
+            <a:schemeClr val="accent1">
+              <a:shade val="50000"/>
+            </a:schemeClr>
+          </a:lnRef>
+          <a:fillRef idx="1">
+            <a:schemeClr val="accent1"/>
+          </a:fillRef>
+          <a:effectRef idx="0">
+            <a:schemeClr val="accent1"/>
+          </a:effectRef>
+          <a:fontRef idx="minor">
+            <a:schemeClr val="lt1"/>
+          </a:fontRef>
+        </p:style>
+        <p:txBody>
+          <a:bodyPr rtlCol="0" anchor="ctr"/>
+          <a:lstStyle/>
+          <a:p>
+            <a:pPr algn="ctr"/>
+            <a:endParaRPr kumimoji="1" lang="ja-JP" altLang="en-US" sz="2000" dirty="0" smtClean="0"/>
+          </a:p>
+        </p:txBody>
+      </p:sp>
+      <p:sp>
+        <p:nvSpPr>
+          <p:cNvPr id="28" name="正方形/長方形 27"/>
+          <p:cNvSpPr/>
+          <p:nvPr/>
+        </p:nvSpPr>
+        <p:spPr>
+          <a:xfrm>
+            <a:off x="1196752" y="4427984"/>
+            <a:ext cx="4824536" cy="1584176"/>
+          </a:xfrm>
+          <a:prstGeom prst="rect">
+            <a:avLst/>
+          </a:prstGeom>
+          <a:noFill/>
+          <a:ln>
+            <a:solidFill>
+              <a:schemeClr val="tx1"/>
+            </a:solidFill>
+          </a:ln>
+        </p:spPr>
+        <p:style>
+          <a:lnRef idx="2">
+            <a:schemeClr val="accent1">
+              <a:shade val="50000"/>
+            </a:schemeClr>
+          </a:lnRef>
+          <a:fillRef idx="1">
+            <a:schemeClr val="accent1"/>
+          </a:fillRef>
+          <a:effectRef idx="0">
+            <a:schemeClr val="accent1"/>
+          </a:effectRef>
+          <a:fontRef idx="minor">
+            <a:schemeClr val="lt1"/>
+          </a:fontRef>
+        </p:style>
+        <p:txBody>
+          <a:bodyPr rtlCol="0" anchor="ctr"/>
+          <a:lstStyle/>
+          <a:p>
+            <a:pPr algn="ctr"/>
+            <a:endParaRPr kumimoji="1" lang="ja-JP" altLang="en-US" dirty="0" smtClean="0"/>
+          </a:p>
+        </p:txBody>
+      </p:sp>
+      <p:sp>
+        <p:nvSpPr>
+          <p:cNvPr id="29" name="正方形/長方形 28"/>
+          <p:cNvSpPr/>
+          <p:nvPr/>
+        </p:nvSpPr>
+        <p:spPr>
+          <a:xfrm>
+            <a:off x="1196752" y="6084168"/>
+            <a:ext cx="4824536" cy="1584176"/>
+          </a:xfrm>
+          <a:prstGeom prst="rect">
+            <a:avLst/>
+          </a:prstGeom>
+          <a:noFill/>
+          <a:ln>
+            <a:solidFill>
+              <a:schemeClr val="tx1"/>
+            </a:solidFill>
+          </a:ln>
+        </p:spPr>
+        <p:style>
+          <a:lnRef idx="2">
+            <a:schemeClr val="accent1">
+              <a:shade val="50000"/>
+            </a:schemeClr>
+          </a:lnRef>
+          <a:fillRef idx="1">
+            <a:schemeClr val="accent1"/>
+          </a:fillRef>
+          <a:effectRef idx="0">
+            <a:schemeClr val="accent1"/>
+          </a:effectRef>
+          <a:fontRef idx="minor">
+            <a:schemeClr val="lt1"/>
+          </a:fontRef>
+        </p:style>
+        <p:txBody>
+          <a:bodyPr rtlCol="0" anchor="ctr"/>
+          <a:lstStyle/>
+          <a:p>
+            <a:pPr algn="ctr"/>
+            <a:endParaRPr kumimoji="1" lang="ja-JP" altLang="en-US" dirty="0" smtClean="0"/>
+          </a:p>
+        </p:txBody>
+      </p:sp>
+      <p:sp>
+        <p:nvSpPr>
+          <p:cNvPr id="30" name="正方形/長方形 29"/>
+          <p:cNvSpPr/>
+          <p:nvPr/>
+        </p:nvSpPr>
+        <p:spPr>
+          <a:xfrm>
+            <a:off x="5085184" y="3851920"/>
+            <a:ext cx="864096" cy="432048"/>
+          </a:xfrm>
+          <a:prstGeom prst="rect">
+            <a:avLst/>
+          </a:prstGeom>
+          <a:blipFill>
+            <a:blip r:embed="rId6" cstate="print"/>
+            <a:stretch>
+              <a:fillRect/>
+            </a:stretch>
+          </a:blipFill>
+          <a:ln>
+            <a:noFill/>
+          </a:ln>
+        </p:spPr>
+        <p:style>
+          <a:lnRef idx="2">
+            <a:schemeClr val="accent1">
+              <a:shade val="50000"/>
+            </a:schemeClr>
+          </a:lnRef>
+          <a:fillRef idx="1">
+            <a:schemeClr val="accent1"/>
+          </a:fillRef>
+          <a:effectRef idx="0">
+            <a:schemeClr val="accent1"/>
+          </a:effectRef>
+          <a:fontRef idx="minor">
+            <a:schemeClr val="lt1"/>
+          </a:fontRef>
+        </p:style>
+        <p:txBody>
+          <a:bodyPr rtlCol="0" anchor="ctr"/>
+          <a:lstStyle/>
+          <a:p>
+            <a:pPr algn="ctr"/>
+            <a:r>
+              <a:rPr kumimoji="1" lang="ja-JP" altLang="en-US" dirty="0" smtClean="0"/>
+              <a:t>詳細</a:t>
+            </a:r>
+            <a:endParaRPr kumimoji="1" lang="en-US" altLang="ja-JP" dirty="0" smtClean="0"/>
+          </a:p>
+        </p:txBody>
+      </p:sp>
+      <p:sp>
+        <p:nvSpPr>
+          <p:cNvPr id="52" name="円形吹き出し 51"/>
+          <p:cNvSpPr/>
+          <p:nvPr/>
+        </p:nvSpPr>
+        <p:spPr>
+          <a:xfrm>
+            <a:off x="-3195736" y="4427984"/>
+            <a:ext cx="2664296" cy="1872208"/>
+          </a:xfrm>
+          <a:prstGeom prst="wedgeEllipseCallout">
+            <a:avLst>
+              <a:gd name="adj1" fmla="val 263972"/>
+              <a:gd name="adj2" fmla="val -62316"/>
+            </a:avLst>
+          </a:prstGeom>
+          <a:solidFill>
+            <a:schemeClr val="tx2">
+              <a:lumMod val="20000"/>
+              <a:lumOff val="80000"/>
+            </a:schemeClr>
+          </a:solidFill>
+          <a:ln>
+            <a:noFill/>
+          </a:ln>
+        </p:spPr>
+        <p:style>
+          <a:lnRef idx="2">
+            <a:schemeClr val="accent1">
+              <a:shade val="50000"/>
+            </a:schemeClr>
+          </a:lnRef>
+          <a:fillRef idx="1">
+            <a:schemeClr val="accent1"/>
+          </a:fillRef>
+          <a:effectRef idx="0">
+            <a:schemeClr val="accent1"/>
+          </a:effectRef>
+          <a:fontRef idx="minor">
+            <a:schemeClr val="lt1"/>
+          </a:fontRef>
+        </p:style>
+        <p:txBody>
+          <a:bodyPr rtlCol="0" anchor="ctr"/>
+          <a:lstStyle/>
+          <a:p>
+            <a:pPr algn="ctr"/>
+            <a:r>
+              <a:rPr lang="ja-JP" altLang="en-US" dirty="0" smtClean="0">
+                <a:solidFill>
+                  <a:schemeClr val="tx1"/>
+                </a:solidFill>
+              </a:rPr>
+              <a:t>ブラウザを開き</a:t>
+            </a:r>
+            <a:endParaRPr lang="en-US" altLang="ja-JP" dirty="0" smtClean="0">
+              <a:solidFill>
+                <a:schemeClr val="tx1"/>
+              </a:solidFill>
+            </a:endParaRPr>
+          </a:p>
+          <a:p>
+            <a:pPr algn="ctr"/>
+            <a:r>
+              <a:rPr lang="ja-JP" altLang="en-US" dirty="0" smtClean="0">
+                <a:solidFill>
+                  <a:schemeClr val="tx1"/>
+                </a:solidFill>
+              </a:rPr>
+              <a:t>その人の</a:t>
+            </a:r>
+            <a:r>
+              <a:rPr lang="en-US" altLang="ja-JP" dirty="0" err="1" smtClean="0">
+                <a:solidFill>
+                  <a:schemeClr val="tx1"/>
+                </a:solidFill>
+              </a:rPr>
+              <a:t>facebook</a:t>
+            </a:r>
+            <a:r>
+              <a:rPr lang="ja-JP" altLang="en-US" dirty="0" smtClean="0">
+                <a:solidFill>
+                  <a:schemeClr val="tx1"/>
+                </a:solidFill>
+              </a:rPr>
+              <a:t>へ。</a:t>
+            </a:r>
+            <a:endParaRPr lang="en-US" altLang="ja-JP" dirty="0" smtClean="0">
+              <a:solidFill>
+                <a:schemeClr val="tx1"/>
+              </a:solidFill>
+            </a:endParaRPr>
+          </a:p>
+          <a:p>
+            <a:pPr algn="ctr"/>
+            <a:r>
+              <a:rPr lang="ja-JP" altLang="en-US" dirty="0" smtClean="0">
+                <a:solidFill>
+                  <a:schemeClr val="tx1"/>
+                </a:solidFill>
+              </a:rPr>
+              <a:t>詳細を見れる</a:t>
+            </a:r>
+            <a:endParaRPr lang="en-US" altLang="ja-JP" dirty="0" smtClean="0">
+              <a:solidFill>
+                <a:schemeClr val="tx1"/>
+              </a:solidFill>
+            </a:endParaRPr>
+          </a:p>
+        </p:txBody>
+      </p:sp>
+      <p:sp>
+        <p:nvSpPr>
+          <p:cNvPr id="31" name="正方形/長方形 30"/>
+          <p:cNvSpPr/>
+          <p:nvPr/>
+        </p:nvSpPr>
+        <p:spPr>
+          <a:xfrm>
+            <a:off x="5085184" y="5508104"/>
+            <a:ext cx="864096" cy="432048"/>
+          </a:xfrm>
+          <a:prstGeom prst="rect">
+            <a:avLst/>
+          </a:prstGeom>
+          <a:blipFill>
+            <a:blip r:embed="rId6" cstate="print"/>
+            <a:stretch>
+              <a:fillRect/>
+            </a:stretch>
+          </a:blipFill>
+          <a:ln>
+            <a:noFill/>
+          </a:ln>
+        </p:spPr>
+        <p:style>
+          <a:lnRef idx="2">
+            <a:schemeClr val="accent1">
+              <a:shade val="50000"/>
+            </a:schemeClr>
+          </a:lnRef>
+          <a:fillRef idx="1">
+            <a:schemeClr val="accent1"/>
+          </a:fillRef>
+          <a:effectRef idx="0">
+            <a:schemeClr val="accent1"/>
+          </a:effectRef>
+          <a:fontRef idx="minor">
+            <a:schemeClr val="lt1"/>
+          </a:fontRef>
+        </p:style>
+        <p:txBody>
+          <a:bodyPr rtlCol="0" anchor="ctr"/>
+          <a:lstStyle/>
+          <a:p>
+            <a:pPr algn="ctr"/>
+            <a:r>
+              <a:rPr kumimoji="1" lang="ja-JP" altLang="en-US" dirty="0" smtClean="0"/>
+              <a:t>詳細</a:t>
+            </a:r>
+            <a:endParaRPr kumimoji="1" lang="en-US" altLang="ja-JP" dirty="0" smtClean="0"/>
+          </a:p>
+        </p:txBody>
+      </p:sp>
+      <p:sp>
+        <p:nvSpPr>
+          <p:cNvPr id="34" name="正方形/長方形 33"/>
+          <p:cNvSpPr/>
+          <p:nvPr/>
+        </p:nvSpPr>
+        <p:spPr>
+          <a:xfrm>
+            <a:off x="5085184" y="7164288"/>
+            <a:ext cx="864096" cy="432048"/>
+          </a:xfrm>
+          <a:prstGeom prst="rect">
+            <a:avLst/>
+          </a:prstGeom>
+          <a:blipFill>
+            <a:blip r:embed="rId6" cstate="print"/>
+            <a:stretch>
+              <a:fillRect/>
+            </a:stretch>
+          </a:blipFill>
+          <a:ln>
+            <a:noFill/>
+          </a:ln>
+        </p:spPr>
+        <p:style>
+          <a:lnRef idx="2">
+            <a:schemeClr val="accent1">
+              <a:shade val="50000"/>
+            </a:schemeClr>
+          </a:lnRef>
+          <a:fillRef idx="1">
+            <a:schemeClr val="accent1"/>
+          </a:fillRef>
+          <a:effectRef idx="0">
+            <a:schemeClr val="accent1"/>
+          </a:effectRef>
+          <a:fontRef idx="minor">
+            <a:schemeClr val="lt1"/>
+          </a:fontRef>
+        </p:style>
+        <p:txBody>
+          <a:bodyPr rtlCol="0" anchor="ctr"/>
+          <a:lstStyle/>
+          <a:p>
+            <a:pPr algn="ctr"/>
+            <a:r>
+              <a:rPr kumimoji="1" lang="ja-JP" altLang="en-US" dirty="0" smtClean="0"/>
+              <a:t>詳細</a:t>
+            </a:r>
+            <a:endParaRPr kumimoji="1" lang="en-US" altLang="ja-JP" dirty="0" smtClean="0"/>
+          </a:p>
+        </p:txBody>
+      </p:sp>
+      <p:sp>
+        <p:nvSpPr>
+          <p:cNvPr id="35" name="円形吹き出し 34"/>
+          <p:cNvSpPr/>
+          <p:nvPr/>
+        </p:nvSpPr>
+        <p:spPr>
+          <a:xfrm>
+            <a:off x="-4995936" y="2555776"/>
+            <a:ext cx="2664296" cy="1872208"/>
+          </a:xfrm>
+          <a:prstGeom prst="wedgeEllipseCallout">
+            <a:avLst>
+              <a:gd name="adj1" fmla="val 177511"/>
+              <a:gd name="adj2" fmla="val 16581"/>
+            </a:avLst>
+          </a:prstGeom>
+          <a:solidFill>
+            <a:schemeClr val="tx2">
+              <a:lumMod val="20000"/>
+              <a:lumOff val="80000"/>
+            </a:schemeClr>
+          </a:solidFill>
+          <a:ln>
+            <a:noFill/>
+          </a:ln>
+        </p:spPr>
+        <p:style>
+          <a:lnRef idx="2">
+            <a:schemeClr val="accent1">
+              <a:shade val="50000"/>
+            </a:schemeClr>
+          </a:lnRef>
+          <a:fillRef idx="1">
+            <a:schemeClr val="accent1"/>
+          </a:fillRef>
+          <a:effectRef idx="0">
+            <a:schemeClr val="accent1"/>
+          </a:effectRef>
+          <a:fontRef idx="minor">
+            <a:schemeClr val="lt1"/>
+          </a:fontRef>
+        </p:style>
+        <p:txBody>
+          <a:bodyPr rtlCol="0" anchor="ctr"/>
+          <a:lstStyle/>
+          <a:p>
+            <a:pPr algn="ctr"/>
+            <a:r>
+              <a:rPr lang="ja-JP" altLang="en-US" dirty="0" smtClean="0">
+                <a:solidFill>
+                  <a:schemeClr val="tx1"/>
+                </a:solidFill>
+              </a:rPr>
+              <a:t>ロングプレスで選択</a:t>
+            </a:r>
+            <a:endParaRPr lang="en-US" altLang="ja-JP" dirty="0" smtClean="0">
+              <a:solidFill>
+                <a:schemeClr val="tx1"/>
+              </a:solidFill>
+            </a:endParaRPr>
+          </a:p>
+        </p:txBody>
+      </p:sp>
+      <p:sp>
+        <p:nvSpPr>
+          <p:cNvPr id="38" name="テキスト ボックス 37"/>
+          <p:cNvSpPr txBox="1"/>
+          <p:nvPr/>
+        </p:nvSpPr>
+        <p:spPr>
+          <a:xfrm>
+            <a:off x="2132856" y="539552"/>
+            <a:ext cx="5661248" cy="461665"/>
+          </a:xfrm>
+          <a:prstGeom prst="rect">
+            <a:avLst/>
+          </a:prstGeom>
+          <a:noFill/>
+        </p:spPr>
+        <p:txBody>
+          <a:bodyPr wrap="square" rtlCol="0">
+            <a:spAutoFit/>
+          </a:bodyPr>
+          <a:lstStyle/>
+          <a:p>
+            <a:r>
+              <a:rPr lang="en-US" altLang="ja-JP" sz="2400" b="1" dirty="0" smtClean="0"/>
+              <a:t>(</a:t>
+            </a:r>
+            <a:r>
+              <a:rPr lang="ja-JP" altLang="en-US" sz="2400" b="1" dirty="0" smtClean="0"/>
+              <a:t>長押しで選択</a:t>
+            </a:r>
+            <a:r>
+              <a:rPr lang="en-US" altLang="ja-JP" sz="2400" b="1" dirty="0" smtClean="0"/>
+              <a:t>)</a:t>
+            </a:r>
+            <a:endParaRPr kumimoji="1" lang="ja-JP" altLang="en-US" sz="2400" b="1" dirty="0"/>
+          </a:p>
+        </p:txBody>
+      </p:sp>
+      <p:sp>
+        <p:nvSpPr>
+          <p:cNvPr id="42" name="テキスト ボックス 41"/>
+          <p:cNvSpPr txBox="1"/>
+          <p:nvPr/>
+        </p:nvSpPr>
+        <p:spPr>
+          <a:xfrm>
+            <a:off x="3212976" y="2915816"/>
+            <a:ext cx="2376264" cy="1200329"/>
+          </a:xfrm>
+          <a:prstGeom prst="rect">
+            <a:avLst/>
+          </a:prstGeom>
+          <a:noFill/>
+        </p:spPr>
+        <p:txBody>
+          <a:bodyPr wrap="square" rtlCol="0">
+            <a:spAutoFit/>
+          </a:bodyPr>
+          <a:lstStyle/>
+          <a:p>
+            <a:r>
+              <a:rPr kumimoji="1" lang="ja-JP" altLang="en-US" dirty="0" smtClean="0"/>
+              <a:t>名前　</a:t>
+            </a:r>
+            <a:r>
+              <a:rPr kumimoji="1" lang="en-US" altLang="ja-JP" dirty="0" smtClean="0"/>
+              <a:t>(</a:t>
+            </a:r>
+            <a:r>
+              <a:rPr kumimoji="1" lang="ja-JP" altLang="en-US" dirty="0" smtClean="0"/>
+              <a:t>名前</a:t>
+            </a:r>
+            <a:r>
+              <a:rPr kumimoji="1" lang="en-US" altLang="ja-JP" dirty="0" smtClean="0"/>
+              <a:t>)</a:t>
+            </a:r>
+          </a:p>
+          <a:p>
+            <a:r>
+              <a:rPr kumimoji="1" lang="ja-JP" altLang="en-US" dirty="0" smtClean="0"/>
+              <a:t>国</a:t>
+            </a:r>
+            <a:r>
+              <a:rPr lang="ja-JP" altLang="en-US" dirty="0" smtClean="0"/>
+              <a:t>　</a:t>
+            </a:r>
+            <a:r>
+              <a:rPr lang="ja-JP" altLang="en-US" dirty="0" smtClean="0"/>
+              <a:t>　　</a:t>
+            </a:r>
+            <a:r>
+              <a:rPr lang="en-US" altLang="ja-JP" dirty="0" smtClean="0"/>
+              <a:t>(</a:t>
+            </a:r>
+            <a:r>
+              <a:rPr lang="ja-JP" altLang="en-US" dirty="0" smtClean="0"/>
+              <a:t>国</a:t>
+            </a:r>
+            <a:r>
+              <a:rPr lang="en-US" altLang="ja-JP" dirty="0" smtClean="0"/>
+              <a:t>)</a:t>
+            </a:r>
+          </a:p>
+          <a:p>
+            <a:endParaRPr kumimoji="1" lang="en-US" altLang="ja-JP" dirty="0" smtClean="0"/>
+          </a:p>
+          <a:p>
+            <a:endParaRPr kumimoji="1" lang="ja-JP" altLang="en-US" dirty="0"/>
+          </a:p>
+        </p:txBody>
+      </p:sp>
     </p:spTree>
   </p:cSld>
   <p:clrMapOvr>
@@ -7656,14 +9767,57 @@
       </p:grpSpPr>
       <p:sp>
         <p:nvSpPr>
-          <p:cNvPr id="36" name="正方形/長方形 35"/>
+          <p:cNvPr id="66" name="正方形/長方形 65"/>
           <p:cNvSpPr/>
           <p:nvPr/>
         </p:nvSpPr>
         <p:spPr>
           <a:xfrm>
-            <a:off x="2204864" y="7812360"/>
-            <a:ext cx="2736304" cy="936104"/>
+            <a:off x="6597352" y="827584"/>
+            <a:ext cx="260648" cy="8316416"/>
+          </a:xfrm>
+          <a:prstGeom prst="rect">
+            <a:avLst/>
+          </a:prstGeom>
+          <a:solidFill>
+            <a:schemeClr val="bg1"/>
+          </a:solidFill>
+        </p:spPr>
+        <p:style>
+          <a:lnRef idx="2">
+            <a:schemeClr val="accent1">
+              <a:shade val="50000"/>
+            </a:schemeClr>
+          </a:lnRef>
+          <a:fillRef idx="1">
+            <a:schemeClr val="accent1"/>
+          </a:fillRef>
+          <a:effectRef idx="0">
+            <a:schemeClr val="accent1"/>
+          </a:effectRef>
+          <a:fontRef idx="minor">
+            <a:schemeClr val="lt1"/>
+          </a:fontRef>
+        </p:style>
+        <p:txBody>
+          <a:bodyPr rtlCol="0" anchor="ctr"/>
+          <a:lstStyle/>
+          <a:p>
+            <a:pPr algn="ctr"/>
+            <a:endParaRPr kumimoji="1" lang="ja-JP" altLang="en-US"/>
+          </a:p>
+        </p:txBody>
+      </p:sp>
+      <p:sp>
+        <p:nvSpPr>
+          <p:cNvPr id="10" name="正方形/長方形 9"/>
+          <p:cNvSpPr/>
+          <p:nvPr/>
+        </p:nvSpPr>
+        <p:spPr>
+          <a:xfrm>
+            <a:off x="-243408" y="0"/>
+            <a:ext cx="7362056" cy="792088"/>
           </a:xfrm>
           <a:prstGeom prst="rect">
             <a:avLst/>
@@ -7675,7 +9829,9 @@
             </a:stretch>
           </a:blipFill>
           <a:ln>
-            <a:noFill/>
+            <a:solidFill>
+              <a:srgbClr val="9A7266"/>
+            </a:solidFill>
           </a:ln>
         </p:spPr>
         <p:style>
@@ -7699,1215 +9855,7 @@
           <a:lstStyle/>
           <a:p>
             <a:pPr algn="ctr"/>
-            <a:r>
-              <a:rPr lang="en-US" altLang="ja-JP" sz="3600" dirty="0" smtClean="0"/>
-              <a:t>OK</a:t>
-            </a:r>
-            <a:endParaRPr kumimoji="1" lang="ja-JP" altLang="en-US" sz="3600" dirty="0"/>
-          </a:p>
-        </p:txBody>
-      </p:sp>
-      <p:sp>
-        <p:nvSpPr>
-          <p:cNvPr id="22" name="テキスト ボックス 21"/>
-          <p:cNvSpPr txBox="1"/>
-          <p:nvPr/>
-        </p:nvSpPr>
-        <p:spPr>
-          <a:xfrm>
-            <a:off x="692696" y="251520"/>
-            <a:ext cx="5661248" cy="461665"/>
-          </a:xfrm>
-          <a:prstGeom prst="rect">
-            <a:avLst/>
-          </a:prstGeom>
-          <a:noFill/>
-        </p:spPr>
-        <p:txBody>
-          <a:bodyPr wrap="square" rtlCol="0">
-            <a:spAutoFit/>
-          </a:bodyPr>
-          <a:lstStyle/>
-          <a:p>
-            <a:r>
-              <a:rPr lang="ja-JP" altLang="en-US" sz="2400" b="1" dirty="0" smtClean="0"/>
-              <a:t>どのアカウントから話題をさがしますか</a:t>
-            </a:r>
-            <a:r>
-              <a:rPr lang="en-US" altLang="ja-JP" sz="2400" b="1" dirty="0" smtClean="0"/>
-              <a:t>?</a:t>
-            </a:r>
-            <a:endParaRPr kumimoji="1" lang="ja-JP" altLang="en-US" sz="2400" b="1" dirty="0"/>
-          </a:p>
-        </p:txBody>
-      </p:sp>
-      <p:sp>
-        <p:nvSpPr>
-          <p:cNvPr id="32" name="正方形/長方形 31"/>
-          <p:cNvSpPr/>
-          <p:nvPr/>
-        </p:nvSpPr>
-        <p:spPr>
-          <a:xfrm>
-            <a:off x="0" y="1979712"/>
-            <a:ext cx="692696" cy="720080"/>
-          </a:xfrm>
-          <a:prstGeom prst="rect">
-            <a:avLst/>
-          </a:prstGeom>
-        </p:spPr>
-        <p:style>
-          <a:lnRef idx="2">
-            <a:schemeClr val="accent1">
-              <a:shade val="50000"/>
-            </a:schemeClr>
-          </a:lnRef>
-          <a:fillRef idx="1">
-            <a:schemeClr val="accent1"/>
-          </a:fillRef>
-          <a:effectRef idx="0">
-            <a:schemeClr val="accent1"/>
-          </a:effectRef>
-          <a:fontRef idx="minor">
-            <a:schemeClr val="lt1"/>
-          </a:fontRef>
-        </p:style>
-        <p:txBody>
-          <a:bodyPr rtlCol="0" anchor="ctr"/>
-          <a:lstStyle/>
-          <a:p>
-            <a:pPr algn="ctr"/>
-            <a:r>
-              <a:rPr kumimoji="1" lang="en-US" altLang="ja-JP" dirty="0" smtClean="0"/>
-              <a:t>FB</a:t>
-            </a:r>
-          </a:p>
-          <a:p>
-            <a:pPr algn="ctr"/>
-            <a:r>
-              <a:rPr kumimoji="1" lang="ja-JP" altLang="en-US" dirty="0" smtClean="0"/>
-              <a:t>ロゴ</a:t>
-            </a:r>
             <a:endParaRPr kumimoji="1" lang="ja-JP" altLang="en-US" dirty="0"/>
-          </a:p>
-        </p:txBody>
-      </p:sp>
-      <p:sp>
-        <p:nvSpPr>
-          <p:cNvPr id="33" name="正方形/長方形 32"/>
-          <p:cNvSpPr/>
-          <p:nvPr/>
-        </p:nvSpPr>
-        <p:spPr>
-          <a:xfrm>
-            <a:off x="0" y="3491880"/>
-            <a:ext cx="620688" cy="648072"/>
-          </a:xfrm>
-          <a:prstGeom prst="rect">
-            <a:avLst/>
-          </a:prstGeom>
-        </p:spPr>
-        <p:style>
-          <a:lnRef idx="2">
-            <a:schemeClr val="accent1">
-              <a:shade val="50000"/>
-            </a:schemeClr>
-          </a:lnRef>
-          <a:fillRef idx="1">
-            <a:schemeClr val="accent1"/>
-          </a:fillRef>
-          <a:effectRef idx="0">
-            <a:schemeClr val="accent1"/>
-          </a:effectRef>
-          <a:fontRef idx="minor">
-            <a:schemeClr val="lt1"/>
-          </a:fontRef>
-        </p:style>
-        <p:txBody>
-          <a:bodyPr rtlCol="0" anchor="ctr"/>
-          <a:lstStyle/>
-          <a:p>
-            <a:pPr algn="ctr"/>
-            <a:r>
-              <a:rPr kumimoji="1" lang="en-US" altLang="ja-JP" dirty="0" smtClean="0"/>
-              <a:t>TW</a:t>
-            </a:r>
-          </a:p>
-          <a:p>
-            <a:pPr algn="ctr"/>
-            <a:r>
-              <a:rPr lang="ja-JP" altLang="en-US" dirty="0" smtClean="0"/>
-              <a:t>ロゴ</a:t>
-            </a:r>
-            <a:endParaRPr kumimoji="1" lang="ja-JP" altLang="en-US" dirty="0"/>
-          </a:p>
-        </p:txBody>
-      </p:sp>
-      <p:sp>
-        <p:nvSpPr>
-          <p:cNvPr id="39" name="正方形/長方形 38"/>
-          <p:cNvSpPr/>
-          <p:nvPr/>
-        </p:nvSpPr>
-        <p:spPr>
-          <a:xfrm>
-            <a:off x="3501008" y="1691680"/>
-            <a:ext cx="1368152" cy="1224136"/>
-          </a:xfrm>
-          <a:prstGeom prst="rect">
-            <a:avLst/>
-          </a:prstGeom>
-        </p:spPr>
-        <p:style>
-          <a:lnRef idx="2">
-            <a:schemeClr val="accent1">
-              <a:shade val="50000"/>
-            </a:schemeClr>
-          </a:lnRef>
-          <a:fillRef idx="1">
-            <a:schemeClr val="accent1"/>
-          </a:fillRef>
-          <a:effectRef idx="0">
-            <a:schemeClr val="accent1"/>
-          </a:effectRef>
-          <a:fontRef idx="minor">
-            <a:schemeClr val="lt1"/>
-          </a:fontRef>
-        </p:style>
-        <p:txBody>
-          <a:bodyPr rtlCol="0" anchor="ctr"/>
-          <a:lstStyle/>
-          <a:p>
-            <a:pPr algn="ctr"/>
-            <a:r>
-              <a:rPr kumimoji="1" lang="ja-JP" altLang="en-US" dirty="0" smtClean="0"/>
-              <a:t>アカウント</a:t>
-            </a:r>
-            <a:endParaRPr kumimoji="1" lang="en-US" altLang="ja-JP" dirty="0" smtClean="0"/>
-          </a:p>
-          <a:p>
-            <a:pPr algn="ctr"/>
-            <a:r>
-              <a:rPr lang="ja-JP" altLang="en-US" dirty="0" smtClean="0"/>
-              <a:t>プロフィール画像</a:t>
-            </a:r>
-            <a:endParaRPr kumimoji="1" lang="ja-JP" altLang="en-US" dirty="0"/>
-          </a:p>
-        </p:txBody>
-      </p:sp>
-      <p:sp>
-        <p:nvSpPr>
-          <p:cNvPr id="40" name="正方形/長方形 39"/>
-          <p:cNvSpPr/>
-          <p:nvPr/>
-        </p:nvSpPr>
-        <p:spPr>
-          <a:xfrm>
-            <a:off x="5489848" y="1691680"/>
-            <a:ext cx="1368152" cy="1224136"/>
-          </a:xfrm>
-          <a:prstGeom prst="rect">
-            <a:avLst/>
-          </a:prstGeom>
-        </p:spPr>
-        <p:style>
-          <a:lnRef idx="2">
-            <a:schemeClr val="accent1">
-              <a:shade val="50000"/>
-            </a:schemeClr>
-          </a:lnRef>
-          <a:fillRef idx="1">
-            <a:schemeClr val="accent1"/>
-          </a:fillRef>
-          <a:effectRef idx="0">
-            <a:schemeClr val="accent1"/>
-          </a:effectRef>
-          <a:fontRef idx="minor">
-            <a:schemeClr val="lt1"/>
-          </a:fontRef>
-        </p:style>
-        <p:txBody>
-          <a:bodyPr rtlCol="0" anchor="ctr"/>
-          <a:lstStyle/>
-          <a:p>
-            <a:pPr algn="ctr"/>
-            <a:r>
-              <a:rPr kumimoji="1" lang="ja-JP" altLang="en-US" dirty="0" smtClean="0"/>
-              <a:t>アカウント</a:t>
-            </a:r>
-            <a:endParaRPr kumimoji="1" lang="en-US" altLang="ja-JP" dirty="0" smtClean="0"/>
-          </a:p>
-          <a:p>
-            <a:pPr algn="ctr"/>
-            <a:r>
-              <a:rPr lang="ja-JP" altLang="en-US" dirty="0" smtClean="0"/>
-              <a:t>プロフィール画像</a:t>
-            </a:r>
-            <a:endParaRPr kumimoji="1" lang="ja-JP" altLang="en-US" dirty="0"/>
-          </a:p>
-        </p:txBody>
-      </p:sp>
-      <p:sp>
-        <p:nvSpPr>
-          <p:cNvPr id="46" name="正方形/長方形 45"/>
-          <p:cNvSpPr/>
-          <p:nvPr/>
-        </p:nvSpPr>
-        <p:spPr>
-          <a:xfrm>
-            <a:off x="1124744" y="1619672"/>
-            <a:ext cx="1872208" cy="1440160"/>
-          </a:xfrm>
-          <a:prstGeom prst="rect">
-            <a:avLst/>
-          </a:prstGeom>
-          <a:solidFill>
-            <a:schemeClr val="tx2">
-              <a:lumMod val="20000"/>
-              <a:lumOff val="80000"/>
-            </a:schemeClr>
-          </a:solidFill>
-          <a:ln>
-            <a:noFill/>
-          </a:ln>
-        </p:spPr>
-        <p:style>
-          <a:lnRef idx="2">
-            <a:schemeClr val="accent1">
-              <a:shade val="50000"/>
-            </a:schemeClr>
-          </a:lnRef>
-          <a:fillRef idx="1">
-            <a:schemeClr val="accent1"/>
-          </a:fillRef>
-          <a:effectRef idx="0">
-            <a:schemeClr val="accent1"/>
-          </a:effectRef>
-          <a:fontRef idx="minor">
-            <a:schemeClr val="lt1"/>
-          </a:fontRef>
-        </p:style>
-        <p:txBody>
-          <a:bodyPr rtlCol="0" anchor="ctr"/>
-          <a:lstStyle/>
-          <a:p>
-            <a:pPr algn="ctr"/>
-            <a:endParaRPr kumimoji="1" lang="ja-JP" altLang="en-US" dirty="0">
-              <a:solidFill>
-                <a:schemeClr val="accent1">
-                  <a:lumMod val="20000"/>
-                  <a:lumOff val="80000"/>
-                </a:schemeClr>
-              </a:solidFill>
-            </a:endParaRPr>
-          </a:p>
-        </p:txBody>
-      </p:sp>
-      <p:sp>
-        <p:nvSpPr>
-          <p:cNvPr id="41" name="正方形/長方形 40"/>
-          <p:cNvSpPr/>
-          <p:nvPr/>
-        </p:nvSpPr>
-        <p:spPr>
-          <a:xfrm>
-            <a:off x="7533456" y="1691680"/>
-            <a:ext cx="1368152" cy="1224136"/>
-          </a:xfrm>
-          <a:prstGeom prst="rect">
-            <a:avLst/>
-          </a:prstGeom>
-        </p:spPr>
-        <p:style>
-          <a:lnRef idx="2">
-            <a:schemeClr val="accent1">
-              <a:shade val="50000"/>
-            </a:schemeClr>
-          </a:lnRef>
-          <a:fillRef idx="1">
-            <a:schemeClr val="accent1"/>
-          </a:fillRef>
-          <a:effectRef idx="0">
-            <a:schemeClr val="accent1"/>
-          </a:effectRef>
-          <a:fontRef idx="minor">
-            <a:schemeClr val="lt1"/>
-          </a:fontRef>
-        </p:style>
-        <p:txBody>
-          <a:bodyPr rtlCol="0" anchor="ctr"/>
-          <a:lstStyle/>
-          <a:p>
-            <a:pPr algn="ctr"/>
-            <a:r>
-              <a:rPr kumimoji="1" lang="ja-JP" altLang="en-US" dirty="0" smtClean="0"/>
-              <a:t>アカウント</a:t>
-            </a:r>
-            <a:endParaRPr kumimoji="1" lang="en-US" altLang="ja-JP" dirty="0" smtClean="0"/>
-          </a:p>
-          <a:p>
-            <a:pPr algn="ctr"/>
-            <a:r>
-              <a:rPr lang="ja-JP" altLang="en-US" dirty="0" smtClean="0"/>
-              <a:t>プロフィール画像</a:t>
-            </a:r>
-            <a:endParaRPr kumimoji="1" lang="ja-JP" altLang="en-US" dirty="0"/>
-          </a:p>
-        </p:txBody>
-      </p:sp>
-      <p:sp>
-        <p:nvSpPr>
-          <p:cNvPr id="44" name="円形吹き出し 43"/>
-          <p:cNvSpPr/>
-          <p:nvPr/>
-        </p:nvSpPr>
-        <p:spPr>
-          <a:xfrm>
-            <a:off x="9765704" y="899592"/>
-            <a:ext cx="3456384" cy="1296144"/>
-          </a:xfrm>
-          <a:prstGeom prst="wedgeEllipseCallout">
-            <a:avLst>
-              <a:gd name="adj1" fmla="val -59689"/>
-              <a:gd name="adj2" fmla="val 63970"/>
-            </a:avLst>
-          </a:prstGeom>
-          <a:solidFill>
-            <a:schemeClr val="tx2">
-              <a:lumMod val="20000"/>
-              <a:lumOff val="80000"/>
-            </a:schemeClr>
-          </a:solidFill>
-          <a:ln>
-            <a:noFill/>
-          </a:ln>
-        </p:spPr>
-        <p:style>
-          <a:lnRef idx="2">
-            <a:schemeClr val="accent1">
-              <a:shade val="50000"/>
-            </a:schemeClr>
-          </a:lnRef>
-          <a:fillRef idx="1">
-            <a:schemeClr val="accent1"/>
-          </a:fillRef>
-          <a:effectRef idx="0">
-            <a:schemeClr val="accent1"/>
-          </a:effectRef>
-          <a:fontRef idx="minor">
-            <a:schemeClr val="lt1"/>
-          </a:fontRef>
-        </p:style>
-        <p:txBody>
-          <a:bodyPr rtlCol="0" anchor="ctr"/>
-          <a:lstStyle/>
-          <a:p>
-            <a:pPr algn="ctr"/>
-            <a:r>
-              <a:rPr kumimoji="1" lang="ja-JP" altLang="en-US" dirty="0" smtClean="0">
-                <a:solidFill>
-                  <a:schemeClr val="tx1"/>
-                </a:solidFill>
-              </a:rPr>
-              <a:t>もしたくさん居たら</a:t>
-            </a:r>
-            <a:endParaRPr kumimoji="1" lang="en-US" altLang="ja-JP" dirty="0" smtClean="0">
-              <a:solidFill>
-                <a:schemeClr val="tx1"/>
-              </a:solidFill>
-            </a:endParaRPr>
-          </a:p>
-          <a:p>
-            <a:pPr algn="ctr"/>
-            <a:r>
-              <a:rPr kumimoji="1" lang="ja-JP" altLang="en-US" dirty="0" smtClean="0">
-                <a:solidFill>
-                  <a:schemeClr val="tx1"/>
-                </a:solidFill>
-              </a:rPr>
-              <a:t>横にスワイプできる</a:t>
-            </a:r>
-            <a:endParaRPr kumimoji="1" lang="ja-JP" altLang="en-US" dirty="0">
-              <a:solidFill>
-                <a:schemeClr val="tx1"/>
-              </a:solidFill>
-            </a:endParaRPr>
-          </a:p>
-        </p:txBody>
-      </p:sp>
-      <p:sp>
-        <p:nvSpPr>
-          <p:cNvPr id="45" name="円形吹き出し 44"/>
-          <p:cNvSpPr/>
-          <p:nvPr/>
-        </p:nvSpPr>
-        <p:spPr>
-          <a:xfrm>
-            <a:off x="-3051720" y="827584"/>
-            <a:ext cx="2664296" cy="1872208"/>
-          </a:xfrm>
-          <a:prstGeom prst="wedgeEllipseCallout">
-            <a:avLst>
-              <a:gd name="adj1" fmla="val 82835"/>
-              <a:gd name="adj2" fmla="val 31635"/>
-            </a:avLst>
-          </a:prstGeom>
-          <a:solidFill>
-            <a:schemeClr val="tx2">
-              <a:lumMod val="20000"/>
-              <a:lumOff val="80000"/>
-            </a:schemeClr>
-          </a:solidFill>
-          <a:ln>
-            <a:noFill/>
-          </a:ln>
-        </p:spPr>
-        <p:style>
-          <a:lnRef idx="2">
-            <a:schemeClr val="accent1">
-              <a:shade val="50000"/>
-            </a:schemeClr>
-          </a:lnRef>
-          <a:fillRef idx="1">
-            <a:schemeClr val="accent1"/>
-          </a:fillRef>
-          <a:effectRef idx="0">
-            <a:schemeClr val="accent1"/>
-          </a:effectRef>
-          <a:fontRef idx="minor">
-            <a:schemeClr val="lt1"/>
-          </a:fontRef>
-        </p:style>
-        <p:txBody>
-          <a:bodyPr rtlCol="0" anchor="ctr"/>
-          <a:lstStyle/>
-          <a:p>
-            <a:pPr algn="ctr"/>
-            <a:r>
-              <a:rPr lang="ja-JP" altLang="en-US" dirty="0" smtClean="0">
-                <a:solidFill>
-                  <a:schemeClr val="tx1"/>
-                </a:solidFill>
-              </a:rPr>
-              <a:t>タップ</a:t>
-            </a:r>
-            <a:r>
-              <a:rPr lang="ja-JP" altLang="en-US" dirty="0" smtClean="0">
-                <a:solidFill>
-                  <a:schemeClr val="tx1"/>
-                </a:solidFill>
-              </a:rPr>
-              <a:t>する</a:t>
-            </a:r>
-            <a:r>
-              <a:rPr lang="ja-JP" altLang="en-US" dirty="0" smtClean="0">
-                <a:solidFill>
-                  <a:schemeClr val="tx1"/>
-                </a:solidFill>
-              </a:rPr>
-              <a:t>と</a:t>
-            </a:r>
-            <a:endParaRPr lang="en-US" altLang="ja-JP" dirty="0" smtClean="0">
-              <a:solidFill>
-                <a:schemeClr val="tx1"/>
-              </a:solidFill>
-            </a:endParaRPr>
-          </a:p>
-          <a:p>
-            <a:pPr algn="ctr"/>
-            <a:r>
-              <a:rPr lang="ja-JP" altLang="en-US" dirty="0" smtClean="0">
-                <a:solidFill>
-                  <a:schemeClr val="tx1"/>
-                </a:solidFill>
-              </a:rPr>
-              <a:t>選択状態</a:t>
-            </a:r>
-            <a:endParaRPr lang="en-US" altLang="ja-JP" dirty="0" smtClean="0">
-              <a:solidFill>
-                <a:schemeClr val="tx1"/>
-              </a:solidFill>
-            </a:endParaRPr>
-          </a:p>
-        </p:txBody>
-      </p:sp>
-      <p:sp>
-        <p:nvSpPr>
-          <p:cNvPr id="37" name="正方形/長方形 36"/>
-          <p:cNvSpPr/>
-          <p:nvPr/>
-        </p:nvSpPr>
-        <p:spPr>
-          <a:xfrm>
-            <a:off x="1340768" y="1691680"/>
-            <a:ext cx="1368152" cy="1224136"/>
-          </a:xfrm>
-          <a:prstGeom prst="rect">
-            <a:avLst/>
-          </a:prstGeom>
-        </p:spPr>
-        <p:style>
-          <a:lnRef idx="2">
-            <a:schemeClr val="accent1">
-              <a:shade val="50000"/>
-            </a:schemeClr>
-          </a:lnRef>
-          <a:fillRef idx="1">
-            <a:schemeClr val="accent1"/>
-          </a:fillRef>
-          <a:effectRef idx="0">
-            <a:schemeClr val="accent1"/>
-          </a:effectRef>
-          <a:fontRef idx="minor">
-            <a:schemeClr val="lt1"/>
-          </a:fontRef>
-        </p:style>
-        <p:txBody>
-          <a:bodyPr rtlCol="0" anchor="ctr"/>
-          <a:lstStyle/>
-          <a:p>
-            <a:pPr algn="ctr"/>
-            <a:r>
-              <a:rPr kumimoji="1" lang="ja-JP" altLang="en-US" dirty="0" smtClean="0"/>
-              <a:t>アカウント</a:t>
-            </a:r>
-            <a:endParaRPr kumimoji="1" lang="en-US" altLang="ja-JP" dirty="0" smtClean="0"/>
-          </a:p>
-          <a:p>
-            <a:pPr algn="ctr"/>
-            <a:r>
-              <a:rPr lang="ja-JP" altLang="en-US" dirty="0" smtClean="0"/>
-              <a:t>プロフィール画像</a:t>
-            </a:r>
-            <a:endParaRPr kumimoji="1" lang="ja-JP" altLang="en-US" dirty="0"/>
-          </a:p>
-        </p:txBody>
-      </p:sp>
-      <p:sp>
-        <p:nvSpPr>
-          <p:cNvPr id="47" name="正方形/長方形 46"/>
-          <p:cNvSpPr/>
-          <p:nvPr/>
-        </p:nvSpPr>
-        <p:spPr>
-          <a:xfrm>
-            <a:off x="1340768" y="3131840"/>
-            <a:ext cx="1368152" cy="1224136"/>
-          </a:xfrm>
-          <a:prstGeom prst="rect">
-            <a:avLst/>
-          </a:prstGeom>
-        </p:spPr>
-        <p:style>
-          <a:lnRef idx="2">
-            <a:schemeClr val="accent1">
-              <a:shade val="50000"/>
-            </a:schemeClr>
-          </a:lnRef>
-          <a:fillRef idx="1">
-            <a:schemeClr val="accent1"/>
-          </a:fillRef>
-          <a:effectRef idx="0">
-            <a:schemeClr val="accent1"/>
-          </a:effectRef>
-          <a:fontRef idx="minor">
-            <a:schemeClr val="lt1"/>
-          </a:fontRef>
-        </p:style>
-        <p:txBody>
-          <a:bodyPr rtlCol="0" anchor="ctr"/>
-          <a:lstStyle/>
-          <a:p>
-            <a:pPr algn="ctr"/>
-            <a:r>
-              <a:rPr kumimoji="1" lang="ja-JP" altLang="en-US" dirty="0" smtClean="0"/>
-              <a:t>アカウント</a:t>
-            </a:r>
-            <a:endParaRPr kumimoji="1" lang="en-US" altLang="ja-JP" dirty="0" smtClean="0"/>
-          </a:p>
-          <a:p>
-            <a:pPr algn="ctr"/>
-            <a:r>
-              <a:rPr lang="ja-JP" altLang="en-US" dirty="0" smtClean="0"/>
-              <a:t>プロフィール画像</a:t>
-            </a:r>
-            <a:endParaRPr kumimoji="1" lang="ja-JP" altLang="en-US" dirty="0"/>
-          </a:p>
-        </p:txBody>
-      </p:sp>
-      <p:sp>
-        <p:nvSpPr>
-          <p:cNvPr id="52" name="円形吹き出し 51"/>
-          <p:cNvSpPr/>
-          <p:nvPr/>
-        </p:nvSpPr>
-        <p:spPr>
-          <a:xfrm>
-            <a:off x="-3195736" y="4427984"/>
-            <a:ext cx="2664296" cy="1872208"/>
-          </a:xfrm>
-          <a:prstGeom prst="wedgeEllipseCallout">
-            <a:avLst>
-              <a:gd name="adj1" fmla="val 114296"/>
-              <a:gd name="adj2" fmla="val -69099"/>
-            </a:avLst>
-          </a:prstGeom>
-          <a:solidFill>
-            <a:schemeClr val="tx2">
-              <a:lumMod val="20000"/>
-              <a:lumOff val="80000"/>
-            </a:schemeClr>
-          </a:solidFill>
-          <a:ln>
-            <a:noFill/>
-          </a:ln>
-        </p:spPr>
-        <p:style>
-          <a:lnRef idx="2">
-            <a:schemeClr val="accent1">
-              <a:shade val="50000"/>
-            </a:schemeClr>
-          </a:lnRef>
-          <a:fillRef idx="1">
-            <a:schemeClr val="accent1"/>
-          </a:fillRef>
-          <a:effectRef idx="0">
-            <a:schemeClr val="accent1"/>
-          </a:effectRef>
-          <a:fontRef idx="minor">
-            <a:schemeClr val="lt1"/>
-          </a:fontRef>
-        </p:style>
-        <p:txBody>
-          <a:bodyPr rtlCol="0" anchor="ctr"/>
-          <a:lstStyle/>
-          <a:p>
-            <a:pPr algn="ctr"/>
-            <a:r>
-              <a:rPr lang="ja-JP" altLang="en-US" dirty="0" smtClean="0">
-                <a:solidFill>
-                  <a:schemeClr val="tx1"/>
-                </a:solidFill>
-              </a:rPr>
-              <a:t>ダブルタッチで</a:t>
-            </a:r>
-            <a:endParaRPr lang="en-US" altLang="ja-JP" dirty="0" smtClean="0">
-              <a:solidFill>
-                <a:schemeClr val="tx1"/>
-              </a:solidFill>
-            </a:endParaRPr>
-          </a:p>
-          <a:p>
-            <a:pPr algn="ctr"/>
-            <a:r>
-              <a:rPr lang="ja-JP" altLang="en-US" dirty="0" smtClean="0">
-                <a:solidFill>
-                  <a:schemeClr val="tx1"/>
-                </a:solidFill>
-              </a:rPr>
-              <a:t>アカウント詳細をダイアログにて</a:t>
-            </a:r>
-            <a:endParaRPr lang="en-US" altLang="ja-JP" dirty="0" smtClean="0">
-              <a:solidFill>
-                <a:schemeClr val="tx1"/>
-              </a:solidFill>
-            </a:endParaRPr>
-          </a:p>
-          <a:p>
-            <a:pPr algn="ctr"/>
-            <a:r>
-              <a:rPr lang="ja-JP" altLang="en-US" dirty="0" smtClean="0">
-                <a:solidFill>
-                  <a:schemeClr val="tx1"/>
-                </a:solidFill>
-              </a:rPr>
-              <a:t>見れる</a:t>
-            </a:r>
-            <a:endParaRPr lang="en-US" altLang="ja-JP" dirty="0" smtClean="0">
-              <a:solidFill>
-                <a:schemeClr val="tx1"/>
-              </a:solidFill>
-            </a:endParaRPr>
-          </a:p>
-        </p:txBody>
-      </p:sp>
-      <p:sp>
-        <p:nvSpPr>
-          <p:cNvPr id="53" name="正方形/長方形 52"/>
-          <p:cNvSpPr/>
-          <p:nvPr/>
-        </p:nvSpPr>
-        <p:spPr>
-          <a:xfrm>
-            <a:off x="8829600" y="3419872"/>
-            <a:ext cx="3528392" cy="5544616"/>
-          </a:xfrm>
-          <a:prstGeom prst="rect">
-            <a:avLst/>
-          </a:prstGeom>
-          <a:solidFill>
-            <a:schemeClr val="bg1"/>
-          </a:solidFill>
-          <a:ln>
-            <a:noFill/>
-          </a:ln>
-        </p:spPr>
-        <p:style>
-          <a:lnRef idx="2">
-            <a:schemeClr val="accent1">
-              <a:shade val="50000"/>
-            </a:schemeClr>
-          </a:lnRef>
-          <a:fillRef idx="1">
-            <a:schemeClr val="accent1"/>
-          </a:fillRef>
-          <a:effectRef idx="0">
-            <a:schemeClr val="accent1"/>
-          </a:effectRef>
-          <a:fontRef idx="minor">
-            <a:schemeClr val="lt1"/>
-          </a:fontRef>
-        </p:style>
-        <p:txBody>
-          <a:bodyPr rtlCol="0" anchor="ctr"/>
-          <a:lstStyle/>
-          <a:p>
-            <a:r>
-              <a:rPr kumimoji="1" lang="en-US" altLang="ja-JP" dirty="0" smtClean="0">
-                <a:solidFill>
-                  <a:schemeClr val="tx1"/>
-                </a:solidFill>
-              </a:rPr>
-              <a:t>×</a:t>
-            </a:r>
-          </a:p>
-          <a:p>
-            <a:endParaRPr kumimoji="1" lang="en-US" altLang="ja-JP" dirty="0" smtClean="0">
-              <a:solidFill>
-                <a:schemeClr val="tx1"/>
-              </a:solidFill>
-            </a:endParaRPr>
-          </a:p>
-          <a:p>
-            <a:pPr algn="ctr"/>
-            <a:endParaRPr lang="en-US" altLang="ja-JP" dirty="0" smtClean="0">
-              <a:solidFill>
-                <a:schemeClr val="tx1"/>
-              </a:solidFill>
-            </a:endParaRPr>
-          </a:p>
-          <a:p>
-            <a:pPr algn="ctr"/>
-            <a:endParaRPr kumimoji="1" lang="en-US" altLang="ja-JP" dirty="0" smtClean="0">
-              <a:solidFill>
-                <a:schemeClr val="tx1"/>
-              </a:solidFill>
-            </a:endParaRPr>
-          </a:p>
-          <a:p>
-            <a:pPr algn="ctr"/>
-            <a:endParaRPr lang="en-US" altLang="ja-JP" dirty="0" smtClean="0">
-              <a:solidFill>
-                <a:schemeClr val="tx1"/>
-              </a:solidFill>
-            </a:endParaRPr>
-          </a:p>
-          <a:p>
-            <a:pPr algn="ctr"/>
-            <a:endParaRPr kumimoji="1" lang="en-US" altLang="ja-JP" dirty="0" smtClean="0">
-              <a:solidFill>
-                <a:schemeClr val="tx1"/>
-              </a:solidFill>
-            </a:endParaRPr>
-          </a:p>
-          <a:p>
-            <a:pPr algn="ctr"/>
-            <a:endParaRPr lang="en-US" altLang="ja-JP" dirty="0" smtClean="0">
-              <a:solidFill>
-                <a:schemeClr val="tx1"/>
-              </a:solidFill>
-            </a:endParaRPr>
-          </a:p>
-          <a:p>
-            <a:pPr algn="ctr"/>
-            <a:endParaRPr kumimoji="1" lang="en-US" altLang="ja-JP" dirty="0" smtClean="0">
-              <a:solidFill>
-                <a:schemeClr val="tx1"/>
-              </a:solidFill>
-            </a:endParaRPr>
-          </a:p>
-          <a:p>
-            <a:pPr algn="ctr"/>
-            <a:endParaRPr lang="en-US" altLang="ja-JP" dirty="0" smtClean="0">
-              <a:solidFill>
-                <a:schemeClr val="tx1"/>
-              </a:solidFill>
-            </a:endParaRPr>
-          </a:p>
-          <a:p>
-            <a:pPr algn="ctr"/>
-            <a:endParaRPr kumimoji="1" lang="en-US" altLang="ja-JP" dirty="0" smtClean="0">
-              <a:solidFill>
-                <a:schemeClr val="tx1"/>
-              </a:solidFill>
-            </a:endParaRPr>
-          </a:p>
-          <a:p>
-            <a:pPr algn="ctr"/>
-            <a:endParaRPr lang="en-US" altLang="ja-JP" dirty="0" smtClean="0">
-              <a:solidFill>
-                <a:schemeClr val="tx1"/>
-              </a:solidFill>
-            </a:endParaRPr>
-          </a:p>
-          <a:p>
-            <a:pPr algn="ctr"/>
-            <a:endParaRPr kumimoji="1" lang="en-US" altLang="ja-JP" dirty="0" smtClean="0">
-              <a:solidFill>
-                <a:schemeClr val="tx1"/>
-              </a:solidFill>
-            </a:endParaRPr>
-          </a:p>
-          <a:p>
-            <a:pPr algn="ctr"/>
-            <a:endParaRPr lang="en-US" altLang="ja-JP" dirty="0" smtClean="0">
-              <a:solidFill>
-                <a:schemeClr val="tx1"/>
-              </a:solidFill>
-            </a:endParaRPr>
-          </a:p>
-          <a:p>
-            <a:pPr algn="ctr"/>
-            <a:endParaRPr kumimoji="1" lang="en-US" altLang="ja-JP" dirty="0" smtClean="0">
-              <a:solidFill>
-                <a:schemeClr val="tx1"/>
-              </a:solidFill>
-            </a:endParaRPr>
-          </a:p>
-          <a:p>
-            <a:pPr algn="ctr"/>
-            <a:endParaRPr lang="en-US" altLang="ja-JP" dirty="0" smtClean="0">
-              <a:solidFill>
-                <a:schemeClr val="tx1"/>
-              </a:solidFill>
-            </a:endParaRPr>
-          </a:p>
-          <a:p>
-            <a:pPr algn="ctr"/>
-            <a:endParaRPr kumimoji="1" lang="en-US" altLang="ja-JP" dirty="0" smtClean="0">
-              <a:solidFill>
-                <a:schemeClr val="tx1"/>
-              </a:solidFill>
-            </a:endParaRPr>
-          </a:p>
-          <a:p>
-            <a:pPr algn="ctr"/>
-            <a:endParaRPr lang="en-US" altLang="ja-JP" dirty="0" smtClean="0">
-              <a:solidFill>
-                <a:schemeClr val="tx1"/>
-              </a:solidFill>
-            </a:endParaRPr>
-          </a:p>
-          <a:p>
-            <a:pPr algn="ctr"/>
-            <a:endParaRPr kumimoji="1" lang="en-US" altLang="ja-JP" dirty="0" smtClean="0">
-              <a:solidFill>
-                <a:schemeClr val="tx1"/>
-              </a:solidFill>
-            </a:endParaRPr>
-          </a:p>
-          <a:p>
-            <a:pPr algn="ctr"/>
-            <a:r>
-              <a:rPr kumimoji="1" lang="ja-JP" altLang="en-US" dirty="0" smtClean="0">
-                <a:solidFill>
-                  <a:schemeClr val="tx1"/>
-                </a:solidFill>
-              </a:rPr>
-              <a:t>詳細ダイアログ</a:t>
-            </a:r>
-            <a:endParaRPr kumimoji="1" lang="ja-JP" altLang="en-US" dirty="0">
-              <a:solidFill>
-                <a:schemeClr val="tx1"/>
-              </a:solidFill>
-            </a:endParaRPr>
-          </a:p>
-        </p:txBody>
-      </p:sp>
-      <p:sp>
-        <p:nvSpPr>
-          <p:cNvPr id="54" name="正方形/長方形 53"/>
-          <p:cNvSpPr/>
-          <p:nvPr/>
-        </p:nvSpPr>
-        <p:spPr>
-          <a:xfrm>
-            <a:off x="9117632" y="3923928"/>
-            <a:ext cx="1080120" cy="1008112"/>
-          </a:xfrm>
-          <a:prstGeom prst="rect">
-            <a:avLst/>
-          </a:prstGeom>
-        </p:spPr>
-        <p:style>
-          <a:lnRef idx="2">
-            <a:schemeClr val="accent1">
-              <a:shade val="50000"/>
-            </a:schemeClr>
-          </a:lnRef>
-          <a:fillRef idx="1">
-            <a:schemeClr val="accent1"/>
-          </a:fillRef>
-          <a:effectRef idx="0">
-            <a:schemeClr val="accent1"/>
-          </a:effectRef>
-          <a:fontRef idx="minor">
-            <a:schemeClr val="lt1"/>
-          </a:fontRef>
-        </p:style>
-        <p:txBody>
-          <a:bodyPr rtlCol="0" anchor="ctr"/>
-          <a:lstStyle/>
-          <a:p>
-            <a:pPr algn="ctr"/>
-            <a:r>
-              <a:rPr kumimoji="1" lang="ja-JP" altLang="en-US" dirty="0" smtClean="0"/>
-              <a:t>プロフィール画像</a:t>
-            </a:r>
-            <a:endParaRPr kumimoji="1" lang="ja-JP" altLang="en-US" dirty="0"/>
-          </a:p>
-        </p:txBody>
-      </p:sp>
-      <p:sp>
-        <p:nvSpPr>
-          <p:cNvPr id="55" name="テキスト ボックス 54"/>
-          <p:cNvSpPr txBox="1"/>
-          <p:nvPr/>
-        </p:nvSpPr>
-        <p:spPr>
-          <a:xfrm>
-            <a:off x="10485784" y="3923928"/>
-            <a:ext cx="864096" cy="830997"/>
-          </a:xfrm>
-          <a:prstGeom prst="rect">
-            <a:avLst/>
-          </a:prstGeom>
-          <a:noFill/>
-        </p:spPr>
-        <p:txBody>
-          <a:bodyPr wrap="square" rtlCol="0">
-            <a:spAutoFit/>
-          </a:bodyPr>
-          <a:lstStyle/>
-          <a:p>
-            <a:r>
-              <a:rPr kumimoji="1" lang="ja-JP" altLang="en-US" sz="2400" dirty="0" smtClean="0"/>
-              <a:t>名前</a:t>
-            </a:r>
-            <a:endParaRPr kumimoji="1" lang="en-US" altLang="ja-JP" sz="2400" dirty="0" smtClean="0"/>
-          </a:p>
-          <a:p>
-            <a:r>
-              <a:rPr lang="en-US" altLang="ja-JP" sz="2400" dirty="0" smtClean="0"/>
-              <a:t>ID</a:t>
-            </a:r>
-            <a:endParaRPr kumimoji="1" lang="ja-JP" altLang="en-US" sz="2400" dirty="0"/>
-          </a:p>
-        </p:txBody>
-      </p:sp>
-      <p:sp>
-        <p:nvSpPr>
-          <p:cNvPr id="56" name="テキスト ボックス 55"/>
-          <p:cNvSpPr txBox="1"/>
-          <p:nvPr/>
-        </p:nvSpPr>
-        <p:spPr>
-          <a:xfrm>
-            <a:off x="9189640" y="5364088"/>
-            <a:ext cx="2736304" cy="646331"/>
-          </a:xfrm>
-          <a:prstGeom prst="rect">
-            <a:avLst/>
-          </a:prstGeom>
-          <a:noFill/>
-        </p:spPr>
-        <p:txBody>
-          <a:bodyPr wrap="square" rtlCol="0">
-            <a:spAutoFit/>
-          </a:bodyPr>
-          <a:lstStyle/>
-          <a:p>
-            <a:r>
-              <a:rPr kumimoji="1" lang="ja-JP" altLang="en-US" dirty="0" smtClean="0"/>
-              <a:t>プロフィール情報</a:t>
-            </a:r>
-            <a:endParaRPr kumimoji="1" lang="en-US" altLang="ja-JP" dirty="0" smtClean="0"/>
-          </a:p>
-          <a:p>
-            <a:endParaRPr kumimoji="1" lang="en-US" altLang="ja-JP" dirty="0" smtClean="0"/>
-          </a:p>
-        </p:txBody>
-      </p:sp>
-    </p:spTree>
-  </p:cSld>
-  <p:clrMapOvr>
-    <a:masterClrMapping/>
-  </p:clrMapOvr>
-  <p:timing>
-    <p:tnLst>
-      <p:par>
-        <p:cTn id="1" dur="indefinite" restart="never" nodeType="tmRoot"/>
-      </p:par>
-    </p:tnLst>
-  </p:timing>
-</p:sld>
-</file>
-
-<file path=ppt/slides/slide7.xml><?xml version="1.0" encoding="utf-8"?>
-<p:sld xmlns:a="http://schemas.openxmlformats.org/drawingml/2006/main" xmlns:r="http://schemas.openxmlformats.org/officeDocument/2006/relationships" xmlns:p="http://schemas.openxmlformats.org/presentationml/2006/main">
-  <p:cSld>
-    <p:spTree>
-      <p:nvGrpSpPr>
-        <p:cNvPr id="1" name=""/>
-        <p:cNvGrpSpPr/>
-        <p:nvPr/>
-      </p:nvGrpSpPr>
-      <p:grpSpPr>
-        <a:xfrm>
-          <a:off x="0" y="0"/>
-          <a:ext cx="0" cy="0"/>
-          <a:chOff x="0" y="0"/>
-          <a:chExt cx="0" cy="0"/>
-        </a:xfrm>
-      </p:grpSpPr>
-      <p:sp>
-        <p:nvSpPr>
-          <p:cNvPr id="66" name="正方形/長方形 65"/>
-          <p:cNvSpPr/>
-          <p:nvPr/>
-        </p:nvSpPr>
-        <p:spPr>
-          <a:xfrm>
-            <a:off x="6597352" y="827584"/>
-            <a:ext cx="260648" cy="8316416"/>
-          </a:xfrm>
-          <a:prstGeom prst="rect">
-            <a:avLst/>
-          </a:prstGeom>
-          <a:solidFill>
-            <a:schemeClr val="bg1"/>
-          </a:solidFill>
-        </p:spPr>
-        <p:style>
-          <a:lnRef idx="2">
-            <a:schemeClr val="accent1">
-              <a:shade val="50000"/>
-            </a:schemeClr>
-          </a:lnRef>
-          <a:fillRef idx="1">
-            <a:schemeClr val="accent1"/>
-          </a:fillRef>
-          <a:effectRef idx="0">
-            <a:schemeClr val="accent1"/>
-          </a:effectRef>
-          <a:fontRef idx="minor">
-            <a:schemeClr val="lt1"/>
-          </a:fontRef>
-        </p:style>
-        <p:txBody>
-          <a:bodyPr rtlCol="0" anchor="ctr"/>
-          <a:lstStyle/>
-          <a:p>
-            <a:pPr algn="ctr"/>
-            <a:endParaRPr kumimoji="1" lang="ja-JP" altLang="en-US"/>
-          </a:p>
-        </p:txBody>
-      </p:sp>
-      <p:sp>
-        <p:nvSpPr>
-          <p:cNvPr id="10" name="正方形/長方形 9"/>
-          <p:cNvSpPr/>
-          <p:nvPr/>
-        </p:nvSpPr>
-        <p:spPr>
-          <a:xfrm>
-            <a:off x="-243408" y="0"/>
-            <a:ext cx="7362056" cy="792088"/>
-          </a:xfrm>
-          <a:prstGeom prst="rect">
-            <a:avLst/>
-          </a:prstGeom>
-          <a:solidFill>
-            <a:srgbClr val="76584E"/>
-          </a:solidFill>
-          <a:ln>
-            <a:solidFill>
-              <a:srgbClr val="9A7266"/>
-            </a:solidFill>
-          </a:ln>
-        </p:spPr>
-        <p:style>
-          <a:lnRef idx="2">
-            <a:schemeClr val="accent1">
-              <a:shade val="50000"/>
-            </a:schemeClr>
-          </a:lnRef>
-          <a:fillRef idx="1">
-            <a:schemeClr val="accent1"/>
-          </a:fillRef>
-          <a:effectRef idx="0">
-            <a:schemeClr val="accent1"/>
-          </a:effectRef>
-          <a:fontRef idx="minor">
-            <a:schemeClr val="lt1"/>
-          </a:fontRef>
-        </p:style>
-        <p:txBody>
-          <a:bodyPr rtlCol="0" anchor="ctr"/>
-          <a:lstStyle/>
-          <a:p>
-            <a:pPr algn="ctr"/>
-            <a:endParaRPr kumimoji="1" lang="ja-JP" altLang="en-US" dirty="0"/>
-          </a:p>
-        </p:txBody>
-      </p:sp>
-      <p:sp>
-        <p:nvSpPr>
-          <p:cNvPr id="28" name="テキスト ボックス 27"/>
-          <p:cNvSpPr txBox="1"/>
-          <p:nvPr/>
-        </p:nvSpPr>
-        <p:spPr>
-          <a:xfrm>
-            <a:off x="4941168" y="251520"/>
-            <a:ext cx="1656184" cy="400110"/>
-          </a:xfrm>
-          <a:prstGeom prst="rect">
-            <a:avLst/>
-          </a:prstGeom>
-          <a:solidFill>
-            <a:srgbClr val="9A7266"/>
-          </a:solidFill>
-        </p:spPr>
-        <p:txBody>
-          <a:bodyPr wrap="square" rtlCol="0">
-            <a:spAutoFit/>
-          </a:bodyPr>
-          <a:lstStyle/>
-          <a:p>
-            <a:r>
-              <a:rPr kumimoji="1" lang="ja-JP" altLang="en-US" sz="2000" dirty="0" smtClean="0">
-                <a:solidFill>
-                  <a:schemeClr val="bg1"/>
-                </a:solidFill>
-              </a:rPr>
-              <a:t>ホーム</a:t>
-            </a:r>
-            <a:endParaRPr kumimoji="1" lang="ja-JP" altLang="en-US" sz="2000" dirty="0">
-              <a:solidFill>
-                <a:schemeClr val="bg1"/>
-              </a:solidFill>
-            </a:endParaRPr>
           </a:p>
         </p:txBody>
       </p:sp>
@@ -8956,7 +9904,7 @@
         </p:grpSpPr>
         <p:sp>
           <p:nvSpPr>
-            <p:cNvPr id="55" name="正方形/長方形 54"/>
+            <p:cNvPr id="55" name="角丸四角形 54"/>
             <p:cNvSpPr/>
             <p:nvPr/>
           </p:nvSpPr>
@@ -8965,9 +9913,15 @@
               <a:off x="548680" y="3491880"/>
               <a:ext cx="5832648" cy="2448272"/>
             </a:xfrm>
-            <a:prstGeom prst="rect">
+            <a:prstGeom prst="roundRect">
               <a:avLst/>
             </a:prstGeom>
+            <a:solidFill>
+              <a:schemeClr val="bg1"/>
+            </a:solidFill>
+            <a:ln>
+              <a:noFill/>
+            </a:ln>
           </p:spPr>
           <p:style>
             <a:lnRef idx="2">
@@ -9128,7 +10082,7 @@
           </p:nvSpPr>
           <p:spPr>
             <a:xfrm>
-              <a:off x="908720" y="5266555"/>
+              <a:off x="908720" y="5266556"/>
               <a:ext cx="5112568" cy="559724"/>
             </a:xfrm>
             <a:prstGeom prst="rect">
@@ -9144,16 +10098,60 @@
             <a:p>
               <a:r>
                 <a:rPr lang="ja-JP" altLang="en-US" sz="2000" dirty="0" smtClean="0"/>
-                <a:t>記事内容。</a:t>
+                <a:t>記事内容</a:t>
+              </a:r>
+              <a:r>
+                <a:rPr lang="ja-JP" altLang="en-US" sz="2000" dirty="0" smtClean="0"/>
+                <a:t>。</a:t>
+              </a:r>
+              <a:r>
+                <a:rPr lang="en-US" altLang="ja-JP" sz="2000" dirty="0" smtClean="0"/>
+                <a:t>(</a:t>
+              </a:r>
+              <a:r>
+                <a:rPr lang="ja-JP" altLang="en-US" sz="2000" dirty="0" smtClean="0"/>
+                <a:t>長かったらもっと見る</a:t>
+              </a:r>
+              <a:r>
+                <a:rPr lang="ja-JP" altLang="en-US" sz="2000" dirty="0" err="1" smtClean="0"/>
+                <a:t>で</a:t>
+              </a:r>
+              <a:r>
+                <a:rPr lang="ja-JP" altLang="en-US" sz="2000" dirty="0" smtClean="0"/>
+                <a:t>全文</a:t>
+              </a:r>
+              <a:r>
+                <a:rPr lang="en-US" altLang="ja-JP" sz="2000" dirty="0" smtClean="0"/>
+                <a:t>)</a:t>
               </a:r>
               <a:endParaRPr lang="en-US" altLang="ja-JP" sz="2000" dirty="0" smtClean="0"/>
             </a:p>
             <a:p>
               <a:r>
-                <a:rPr kumimoji="1" lang="ja-JP" altLang="en-US" sz="2000" dirty="0" smtClean="0"/>
-                <a:t>長ければ、もっと見るボタンで全文読める。</a:t>
+                <a:rPr lang="en-US" altLang="ja-JP" sz="2000" dirty="0" smtClean="0"/>
+                <a:t>	</a:t>
               </a:r>
-              <a:endParaRPr kumimoji="1" lang="ja-JP" altLang="en-US" sz="2000" dirty="0"/>
+              <a:r>
+                <a:rPr lang="en-US" altLang="ja-JP" sz="2000" dirty="0" smtClean="0"/>
+                <a:t>	</a:t>
+              </a:r>
+              <a:r>
+                <a:rPr lang="ja-JP" altLang="en-US" sz="2000" dirty="0" smtClean="0">
+                  <a:solidFill>
+                    <a:schemeClr val="accent1">
+                      <a:lumMod val="75000"/>
+                    </a:schemeClr>
+                  </a:solidFill>
+                </a:rPr>
+                <a:t>･･･もっと見る</a:t>
+              </a:r>
+              <a:endParaRPr kumimoji="1" lang="ja-JP" altLang="en-US" sz="2000" dirty="0">
+                <a:solidFill>
+                  <a:schemeClr val="accent1">
+                    <a:lumMod val="75000"/>
+                  </a:schemeClr>
+                </a:solidFill>
+              </a:endParaRPr>
             </a:p>
           </p:txBody>
         </p:sp>
@@ -9174,7 +10172,7 @@
         </p:grpSpPr>
         <p:sp>
           <p:nvSpPr>
-            <p:cNvPr id="60" name="正方形/長方形 59"/>
+            <p:cNvPr id="60" name="角丸四角形 59"/>
             <p:cNvSpPr/>
             <p:nvPr/>
           </p:nvSpPr>
@@ -9183,9 +10181,15 @@
               <a:off x="548680" y="3389866"/>
               <a:ext cx="5832648" cy="2448272"/>
             </a:xfrm>
-            <a:prstGeom prst="rect">
+            <a:prstGeom prst="roundRect">
               <a:avLst/>
             </a:prstGeom>
+            <a:solidFill>
+              <a:schemeClr val="bg1"/>
+            </a:solidFill>
+            <a:ln>
+              <a:noFill/>
+            </a:ln>
           </p:spPr>
           <p:style>
             <a:lnRef idx="2">
@@ -9266,8 +10270,8 @@
           </p:nvSpPr>
           <p:spPr>
             <a:xfrm>
-              <a:off x="1147352" y="4307968"/>
-              <a:ext cx="4873936" cy="707885"/>
+              <a:off x="1003336" y="4205957"/>
+              <a:ext cx="4873936" cy="1002838"/>
             </a:xfrm>
             <a:prstGeom prst="rect">
               <a:avLst/>
@@ -9287,10 +10291,6 @@
               <a:endParaRPr lang="en-US" altLang="ja-JP" sz="2000" dirty="0" smtClean="0"/>
             </a:p>
             <a:p>
-              <a:r>
-                <a:rPr kumimoji="1" lang="ja-JP" altLang="en-US" sz="2000" dirty="0" smtClean="0"/>
-                <a:t>長ければ、もっと見るボタンで全文読める。</a:t>
-              </a:r>
               <a:endParaRPr kumimoji="1" lang="ja-JP" altLang="en-US" sz="2000" dirty="0"/>
             </a:p>
           </p:txBody>
@@ -9502,6 +10502,322 @@
           <a:p>
             <a:pPr algn="ctr"/>
             <a:endParaRPr kumimoji="1" lang="ja-JP" altLang="en-US"/>
+          </a:p>
+        </p:txBody>
+      </p:sp>
+      <p:sp>
+        <p:nvSpPr>
+          <p:cNvPr id="21" name="角丸四角形 20"/>
+          <p:cNvSpPr/>
+          <p:nvPr/>
+        </p:nvSpPr>
+        <p:spPr>
+          <a:xfrm>
+            <a:off x="5661248" y="0"/>
+            <a:ext cx="792088" cy="755576"/>
+          </a:xfrm>
+          <a:prstGeom prst="roundRect">
+            <a:avLst/>
+          </a:prstGeom>
+          <a:blipFill>
+            <a:blip r:embed="rId4" cstate="print"/>
+            <a:stretch>
+              <a:fillRect/>
+            </a:stretch>
+          </a:blipFill>
+          <a:ln>
+            <a:noFill/>
+          </a:ln>
+        </p:spPr>
+        <p:style>
+          <a:lnRef idx="2">
+            <a:schemeClr val="accent1">
+              <a:shade val="50000"/>
+            </a:schemeClr>
+          </a:lnRef>
+          <a:fillRef idx="1">
+            <a:schemeClr val="accent1"/>
+          </a:fillRef>
+          <a:effectRef idx="0">
+            <a:schemeClr val="accent1"/>
+          </a:effectRef>
+          <a:fontRef idx="minor">
+            <a:schemeClr val="lt1"/>
+          </a:fontRef>
+        </p:style>
+        <p:txBody>
+          <a:bodyPr rtlCol="0" anchor="ctr"/>
+          <a:lstStyle/>
+          <a:p>
+            <a:pPr algn="ctr"/>
+            <a:endParaRPr kumimoji="1" lang="ja-JP" altLang="en-US" dirty="0" smtClean="0"/>
+          </a:p>
+        </p:txBody>
+      </p:sp>
+      <p:grpSp>
+        <p:nvGrpSpPr>
+          <p:cNvPr id="20" name="グループ化 19"/>
+          <p:cNvGrpSpPr/>
+          <p:nvPr/>
+        </p:nvGrpSpPr>
+        <p:grpSpPr>
+          <a:xfrm>
+            <a:off x="5733256" y="107504"/>
+            <a:ext cx="648072" cy="539552"/>
+            <a:chOff x="5733256" y="0"/>
+            <a:chExt cx="648072" cy="539552"/>
+          </a:xfrm>
+        </p:grpSpPr>
+        <p:sp>
+          <p:nvSpPr>
+            <p:cNvPr id="18" name="二等辺三角形 17"/>
+            <p:cNvSpPr/>
+            <p:nvPr/>
+          </p:nvSpPr>
+          <p:spPr>
+            <a:xfrm>
+              <a:off x="5733256" y="0"/>
+              <a:ext cx="648072" cy="251520"/>
+            </a:xfrm>
+            <a:prstGeom prst="triangle">
+              <a:avLst/>
+            </a:prstGeom>
+            <a:solidFill>
+              <a:schemeClr val="bg1"/>
+            </a:solidFill>
+            <a:ln>
+              <a:noFill/>
+            </a:ln>
+          </p:spPr>
+          <p:style>
+            <a:lnRef idx="2">
+              <a:schemeClr val="accent1">
+                <a:shade val="50000"/>
+              </a:schemeClr>
+            </a:lnRef>
+            <a:fillRef idx="1">
+              <a:schemeClr val="accent1"/>
+            </a:fillRef>
+            <a:effectRef idx="0">
+              <a:schemeClr val="accent1"/>
+            </a:effectRef>
+            <a:fontRef idx="minor">
+              <a:schemeClr val="lt1"/>
+            </a:fontRef>
+          </p:style>
+          <p:txBody>
+            <a:bodyPr rtlCol="0" anchor="ctr"/>
+            <a:lstStyle/>
+            <a:p>
+              <a:pPr algn="ctr"/>
+              <a:endParaRPr kumimoji="1" lang="ja-JP" altLang="en-US" dirty="0" smtClean="0"/>
+            </a:p>
+          </p:txBody>
+        </p:sp>
+        <p:sp>
+          <p:nvSpPr>
+            <p:cNvPr id="19" name="正方形/長方形 18"/>
+            <p:cNvSpPr/>
+            <p:nvPr/>
+          </p:nvSpPr>
+          <p:spPr>
+            <a:xfrm>
+              <a:off x="5877272" y="179512"/>
+              <a:ext cx="360040" cy="360040"/>
+            </a:xfrm>
+            <a:prstGeom prst="rect">
+              <a:avLst/>
+            </a:prstGeom>
+            <a:solidFill>
+              <a:schemeClr val="bg1"/>
+            </a:solidFill>
+            <a:ln>
+              <a:noFill/>
+            </a:ln>
+          </p:spPr>
+          <p:style>
+            <a:lnRef idx="2">
+              <a:schemeClr val="accent1">
+                <a:shade val="50000"/>
+              </a:schemeClr>
+            </a:lnRef>
+            <a:fillRef idx="1">
+              <a:schemeClr val="accent1"/>
+            </a:fillRef>
+            <a:effectRef idx="0">
+              <a:schemeClr val="accent1"/>
+            </a:effectRef>
+            <a:fontRef idx="minor">
+              <a:schemeClr val="lt1"/>
+            </a:fontRef>
+          </p:style>
+          <p:txBody>
+            <a:bodyPr rtlCol="0" anchor="ctr"/>
+            <a:lstStyle/>
+            <a:p>
+              <a:pPr algn="ctr"/>
+              <a:endParaRPr kumimoji="1" lang="ja-JP" altLang="en-US" dirty="0" smtClean="0"/>
+            </a:p>
+          </p:txBody>
+        </p:sp>
+      </p:grpSp>
+      <p:sp>
+        <p:nvSpPr>
+          <p:cNvPr id="22" name="円形吹き出し 21"/>
+          <p:cNvSpPr/>
+          <p:nvPr/>
+        </p:nvSpPr>
+        <p:spPr>
+          <a:xfrm>
+            <a:off x="8181528" y="251520"/>
+            <a:ext cx="3312368" cy="1872208"/>
+          </a:xfrm>
+          <a:prstGeom prst="wedgeEllipseCallout">
+            <a:avLst>
+              <a:gd name="adj1" fmla="val -98731"/>
+              <a:gd name="adj2" fmla="val -24068"/>
+            </a:avLst>
+          </a:prstGeom>
+          <a:solidFill>
+            <a:schemeClr val="tx2">
+              <a:lumMod val="20000"/>
+              <a:lumOff val="80000"/>
+            </a:schemeClr>
+          </a:solidFill>
+          <a:ln>
+            <a:noFill/>
+          </a:ln>
+        </p:spPr>
+        <p:style>
+          <a:lnRef idx="2">
+            <a:schemeClr val="accent1">
+              <a:shade val="50000"/>
+            </a:schemeClr>
+          </a:lnRef>
+          <a:fillRef idx="1">
+            <a:schemeClr val="accent1"/>
+          </a:fillRef>
+          <a:effectRef idx="0">
+            <a:schemeClr val="accent1"/>
+          </a:effectRef>
+          <a:fontRef idx="minor">
+            <a:schemeClr val="lt1"/>
+          </a:fontRef>
+        </p:style>
+        <p:txBody>
+          <a:bodyPr rtlCol="0" anchor="ctr"/>
+          <a:lstStyle/>
+          <a:p>
+            <a:pPr algn="ctr"/>
+            <a:r>
+              <a:rPr lang="ja-JP" altLang="en-US" dirty="0" smtClean="0">
+                <a:solidFill>
+                  <a:schemeClr val="tx1"/>
+                </a:solidFill>
+              </a:rPr>
+              <a:t>ホームへ戻る</a:t>
+            </a:r>
+            <a:endParaRPr lang="en-US" altLang="ja-JP" dirty="0" smtClean="0">
+              <a:solidFill>
+                <a:schemeClr val="tx1"/>
+              </a:solidFill>
+            </a:endParaRPr>
+          </a:p>
+        </p:txBody>
+      </p:sp>
+      <p:sp>
+        <p:nvSpPr>
+          <p:cNvPr id="23" name="円形吹き出し 22"/>
+          <p:cNvSpPr/>
+          <p:nvPr/>
+        </p:nvSpPr>
+        <p:spPr>
+          <a:xfrm>
+            <a:off x="-3987824" y="179512"/>
+            <a:ext cx="3312368" cy="1872208"/>
+          </a:xfrm>
+          <a:prstGeom prst="wedgeEllipseCallout">
+            <a:avLst>
+              <a:gd name="adj1" fmla="val 92916"/>
+              <a:gd name="adj2" fmla="val 105547"/>
+            </a:avLst>
+          </a:prstGeom>
+          <a:solidFill>
+            <a:schemeClr val="tx2">
+              <a:lumMod val="20000"/>
+              <a:lumOff val="80000"/>
+            </a:schemeClr>
+          </a:solidFill>
+          <a:ln>
+            <a:noFill/>
+          </a:ln>
+        </p:spPr>
+        <p:style>
+          <a:lnRef idx="2">
+            <a:schemeClr val="accent1">
+              <a:shade val="50000"/>
+            </a:schemeClr>
+          </a:lnRef>
+          <a:fillRef idx="1">
+            <a:schemeClr val="accent1"/>
+          </a:fillRef>
+          <a:effectRef idx="0">
+            <a:schemeClr val="accent1"/>
+          </a:effectRef>
+          <a:fontRef idx="minor">
+            <a:schemeClr val="lt1"/>
+          </a:fontRef>
+        </p:style>
+        <p:txBody>
+          <a:bodyPr rtlCol="0" anchor="ctr"/>
+          <a:lstStyle/>
+          <a:p>
+            <a:pPr algn="ctr"/>
+            <a:r>
+              <a:rPr lang="ja-JP" altLang="en-US" dirty="0" smtClean="0">
+                <a:solidFill>
+                  <a:schemeClr val="tx1"/>
+                </a:solidFill>
+              </a:rPr>
+              <a:t>出来れば画像</a:t>
+            </a:r>
+            <a:endParaRPr lang="en-US" altLang="ja-JP" dirty="0" smtClean="0">
+              <a:solidFill>
+                <a:schemeClr val="tx1"/>
+              </a:solidFill>
+            </a:endParaRPr>
+          </a:p>
+          <a:p>
+            <a:pPr algn="ctr"/>
+            <a:r>
+              <a:rPr lang="en-US" altLang="ja-JP" dirty="0" smtClean="0">
+                <a:solidFill>
+                  <a:schemeClr val="tx1"/>
+                </a:solidFill>
+              </a:rPr>
+              <a:t>(</a:t>
+            </a:r>
+            <a:r>
+              <a:rPr lang="ja-JP" altLang="en-US" dirty="0" smtClean="0">
+                <a:solidFill>
+                  <a:schemeClr val="tx1"/>
+                </a:solidFill>
+              </a:rPr>
+              <a:t>大きさは調整</a:t>
+            </a:r>
+            <a:r>
+              <a:rPr lang="en-US" altLang="ja-JP" dirty="0" smtClean="0">
+                <a:solidFill>
+                  <a:schemeClr val="tx1"/>
+                </a:solidFill>
+              </a:rPr>
+              <a:t>)</a:t>
+            </a:r>
+            <a:endParaRPr lang="en-US" altLang="ja-JP" dirty="0" smtClean="0">
+              <a:solidFill>
+                <a:schemeClr val="tx1"/>
+              </a:solidFill>
+            </a:endParaRPr>
           </a:p>
         </p:txBody>
       </p:sp>
@@ -9798,7 +11114,43 @@
       </a:bgFillStyleLst>
     </a:fmtScheme>
   </a:themeElements>
-  <a:objectDefaults/>
+  <a:objectDefaults>
+    <a:spDef>
+      <a:spPr>
+        <a:blipFill>
+          <a:blip xmlns:r="http://schemas.openxmlformats.org/officeDocument/2006/relationships" r:embed="rId1" cstate="print"/>
+          <a:stretch>
+            <a:fillRect/>
+          </a:stretch>
+        </a:blipFill>
+        <a:ln>
+          <a:noFill/>
+        </a:ln>
+      </a:spPr>
+      <a:bodyPr rtlCol="0" anchor="ctr"/>
+      <a:lstStyle>
+        <a:defPPr algn="ctr">
+          <a:defRPr dirty="0" smtClean="0"/>
+        </a:defPPr>
+      </a:lstStyle>
+      <a:style>
+        <a:lnRef idx="2">
+          <a:schemeClr val="accent1">
+            <a:shade val="50000"/>
+          </a:schemeClr>
+        </a:lnRef>
+        <a:fillRef idx="1">
+          <a:schemeClr val="accent1"/>
+        </a:fillRef>
+        <a:effectRef idx="0">
+          <a:schemeClr val="accent1"/>
+        </a:effectRef>
+        <a:fontRef idx="minor">
+          <a:schemeClr val="lt1"/>
+        </a:fontRef>
+      </a:style>
+    </a:spDef>
+  </a:objectDefaults>
   <a:extraClrSchemeLst/>
 </a:theme>
 </file>

</xml_diff>